<commit_message>
made few changes to linear regression
</commit_message>
<xml_diff>
--- a/acadgild/24-02-2017/Regression Analysis by example.pptx
+++ b/acadgild/24-02-2017/Regression Analysis by example.pptx
@@ -110,6 +110,11 @@
       </a:defRPr>
     </a:lvl9pPr>
   </p:defaultTextStyle>
+  <p:extLst>
+    <p:ext uri="{EFAFB233-063F-42B5-8137-9DF3F51BA10A}">
+      <p15:sldGuideLst xmlns:p15="http://schemas.microsoft.com/office/powerpoint/2012/main"/>
+    </p:ext>
+  </p:extLst>
 </p:presentation>
 </file>
 
@@ -244,7 +249,7 @@
           <a:p>
             <a:fld id="{D3E71D5E-8525-F341-91C6-9A560A6DCEB6}" type="datetimeFigureOut">
               <a:rPr lang="en-US" smtClean="0"/>
-              <a:t>2/24/17</a:t>
+              <a:t>2/24/2017</a:t>
             </a:fld>
             <a:endParaRPr lang="en-US"/>
           </a:p>
@@ -414,7 +419,7 @@
           <a:p>
             <a:fld id="{D3E71D5E-8525-F341-91C6-9A560A6DCEB6}" type="datetimeFigureOut">
               <a:rPr lang="en-US" smtClean="0"/>
-              <a:t>2/24/17</a:t>
+              <a:t>2/24/2017</a:t>
             </a:fld>
             <a:endParaRPr lang="en-US"/>
           </a:p>
@@ -594,7 +599,7 @@
           <a:p>
             <a:fld id="{D3E71D5E-8525-F341-91C6-9A560A6DCEB6}" type="datetimeFigureOut">
               <a:rPr lang="en-US" smtClean="0"/>
-              <a:t>2/24/17</a:t>
+              <a:t>2/24/2017</a:t>
             </a:fld>
             <a:endParaRPr lang="en-US"/>
           </a:p>
@@ -764,7 +769,7 @@
           <a:p>
             <a:fld id="{D3E71D5E-8525-F341-91C6-9A560A6DCEB6}" type="datetimeFigureOut">
               <a:rPr lang="en-US" smtClean="0"/>
-              <a:t>2/24/17</a:t>
+              <a:t>2/24/2017</a:t>
             </a:fld>
             <a:endParaRPr lang="en-US"/>
           </a:p>
@@ -1010,7 +1015,7 @@
           <a:p>
             <a:fld id="{D3E71D5E-8525-F341-91C6-9A560A6DCEB6}" type="datetimeFigureOut">
               <a:rPr lang="en-US" smtClean="0"/>
-              <a:t>2/24/17</a:t>
+              <a:t>2/24/2017</a:t>
             </a:fld>
             <a:endParaRPr lang="en-US"/>
           </a:p>
@@ -1242,7 +1247,7 @@
           <a:p>
             <a:fld id="{D3E71D5E-8525-F341-91C6-9A560A6DCEB6}" type="datetimeFigureOut">
               <a:rPr lang="en-US" smtClean="0"/>
-              <a:t>2/24/17</a:t>
+              <a:t>2/24/2017</a:t>
             </a:fld>
             <a:endParaRPr lang="en-US"/>
           </a:p>
@@ -1609,7 +1614,7 @@
           <a:p>
             <a:fld id="{D3E71D5E-8525-F341-91C6-9A560A6DCEB6}" type="datetimeFigureOut">
               <a:rPr lang="en-US" smtClean="0"/>
-              <a:t>2/24/17</a:t>
+              <a:t>2/24/2017</a:t>
             </a:fld>
             <a:endParaRPr lang="en-US"/>
           </a:p>
@@ -1727,7 +1732,7 @@
           <a:p>
             <a:fld id="{D3E71D5E-8525-F341-91C6-9A560A6DCEB6}" type="datetimeFigureOut">
               <a:rPr lang="en-US" smtClean="0"/>
-              <a:t>2/24/17</a:t>
+              <a:t>2/24/2017</a:t>
             </a:fld>
             <a:endParaRPr lang="en-US"/>
           </a:p>
@@ -1822,7 +1827,7 @@
           <a:p>
             <a:fld id="{D3E71D5E-8525-F341-91C6-9A560A6DCEB6}" type="datetimeFigureOut">
               <a:rPr lang="en-US" smtClean="0"/>
-              <a:t>2/24/17</a:t>
+              <a:t>2/24/2017</a:t>
             </a:fld>
             <a:endParaRPr lang="en-US"/>
           </a:p>
@@ -2099,7 +2104,7 @@
           <a:p>
             <a:fld id="{D3E71D5E-8525-F341-91C6-9A560A6DCEB6}" type="datetimeFigureOut">
               <a:rPr lang="en-US" smtClean="0"/>
-              <a:t>2/24/17</a:t>
+              <a:t>2/24/2017</a:t>
             </a:fld>
             <a:endParaRPr lang="en-US"/>
           </a:p>
@@ -2352,7 +2357,7 @@
           <a:p>
             <a:fld id="{D3E71D5E-8525-F341-91C6-9A560A6DCEB6}" type="datetimeFigureOut">
               <a:rPr lang="en-US" smtClean="0"/>
-              <a:t>2/24/17</a:t>
+              <a:t>2/24/2017</a:t>
             </a:fld>
             <a:endParaRPr lang="en-US"/>
           </a:p>
@@ -2565,7 +2570,7 @@
           <a:p>
             <a:fld id="{D3E71D5E-8525-F341-91C6-9A560A6DCEB6}" type="datetimeFigureOut">
               <a:rPr lang="en-US" smtClean="0"/>
-              <a:t>2/24/17</a:t>
+              <a:t>2/24/2017</a:t>
             </a:fld>
             <a:endParaRPr lang="en-US"/>
           </a:p>
@@ -3442,8 +3447,8 @@
               <a:t>Covariance and Correlation </a:t>
             </a:r>
             <a:r>
-              <a:rPr lang="en-US" dirty="0" err="1" smtClean="0"/>
-              <a:t>Coeffcient</a:t>
+              <a:rPr lang="en-US" dirty="0" smtClean="0"/>
+              <a:t>Coefficient</a:t>
             </a:r>
             <a:endParaRPr lang="en-US" dirty="0" smtClean="0"/>
           </a:p>

</xml_diff>

<commit_message>
Added sentiment analysis material and regression ppt
</commit_message>
<xml_diff>
--- a/acadgild/24-02-2017/Regression Analysis by example.pptx
+++ b/acadgild/24-02-2017/Regression Analysis by example.pptx
@@ -4,6 +4,9 @@
   <p:sldMasterIdLst>
     <p:sldMasterId id="2147483648" r:id="rId1"/>
   </p:sldMasterIdLst>
+  <p:notesMasterIdLst>
+    <p:notesMasterId r:id="rId36"/>
+  </p:notesMasterIdLst>
   <p:sldIdLst>
     <p:sldId id="256" r:id="rId2"/>
     <p:sldId id="257" r:id="rId3"/>
@@ -11,7 +14,34 @@
     <p:sldId id="259" r:id="rId5"/>
     <p:sldId id="260" r:id="rId6"/>
     <p:sldId id="261" r:id="rId7"/>
-    <p:sldId id="262" r:id="rId8"/>
+    <p:sldId id="290" r:id="rId8"/>
+    <p:sldId id="262" r:id="rId9"/>
+    <p:sldId id="263" r:id="rId10"/>
+    <p:sldId id="264" r:id="rId11"/>
+    <p:sldId id="265" r:id="rId12"/>
+    <p:sldId id="266" r:id="rId13"/>
+    <p:sldId id="267" r:id="rId14"/>
+    <p:sldId id="269" r:id="rId15"/>
+    <p:sldId id="268" r:id="rId16"/>
+    <p:sldId id="270" r:id="rId17"/>
+    <p:sldId id="271" r:id="rId18"/>
+    <p:sldId id="272" r:id="rId19"/>
+    <p:sldId id="273" r:id="rId20"/>
+    <p:sldId id="275" r:id="rId21"/>
+    <p:sldId id="276" r:id="rId22"/>
+    <p:sldId id="277" r:id="rId23"/>
+    <p:sldId id="278" r:id="rId24"/>
+    <p:sldId id="280" r:id="rId25"/>
+    <p:sldId id="281" r:id="rId26"/>
+    <p:sldId id="282" r:id="rId27"/>
+    <p:sldId id="283" r:id="rId28"/>
+    <p:sldId id="284" r:id="rId29"/>
+    <p:sldId id="279" r:id="rId30"/>
+    <p:sldId id="285" r:id="rId31"/>
+    <p:sldId id="286" r:id="rId32"/>
+    <p:sldId id="287" r:id="rId33"/>
+    <p:sldId id="289" r:id="rId34"/>
+    <p:sldId id="288" r:id="rId35"/>
   </p:sldIdLst>
   <p:sldSz cx="12192000" cy="6858000"/>
   <p:notesSz cx="6858000" cy="9144000"/>
@@ -118,6 +148,356 @@
 </p:presentation>
 </file>
 
+<file path=ppt/notesMasters/notesMaster1.xml><?xml version="1.0" encoding="utf-8"?>
+<p:notesMaster xmlns:a="http://schemas.openxmlformats.org/drawingml/2006/main" xmlns:r="http://schemas.openxmlformats.org/officeDocument/2006/relationships" xmlns:p="http://schemas.openxmlformats.org/presentationml/2006/main">
+  <p:cSld>
+    <p:bg>
+      <p:bgRef idx="1001">
+        <a:schemeClr val="bg1"/>
+      </p:bgRef>
+    </p:bg>
+    <p:spTree>
+      <p:nvGrpSpPr>
+        <p:cNvPr id="1" name=""/>
+        <p:cNvGrpSpPr/>
+        <p:nvPr/>
+      </p:nvGrpSpPr>
+      <p:grpSpPr>
+        <a:xfrm>
+          <a:off x="0" y="0"/>
+          <a:ext cx="0" cy="0"/>
+          <a:chOff x="0" y="0"/>
+          <a:chExt cx="0" cy="0"/>
+        </a:xfrm>
+      </p:grpSpPr>
+      <p:sp>
+        <p:nvSpPr>
+          <p:cNvPr id="2" name="Header Placeholder 1"/>
+          <p:cNvSpPr>
+            <a:spLocks noGrp="1"/>
+          </p:cNvSpPr>
+          <p:nvPr>
+            <p:ph type="hdr" sz="quarter"/>
+          </p:nvPr>
+        </p:nvSpPr>
+        <p:spPr>
+          <a:xfrm>
+            <a:off x="0" y="0"/>
+            <a:ext cx="2971800" cy="458788"/>
+          </a:xfrm>
+          <a:prstGeom prst="rect">
+            <a:avLst/>
+          </a:prstGeom>
+        </p:spPr>
+        <p:txBody>
+          <a:bodyPr vert="horz" lIns="91440" tIns="45720" rIns="91440" bIns="45720" rtlCol="0"/>
+          <a:lstStyle>
+            <a:lvl1pPr algn="l">
+              <a:defRPr sz="1200"/>
+            </a:lvl1pPr>
+          </a:lstStyle>
+          <a:p>
+            <a:endParaRPr lang="en-US"/>
+          </a:p>
+        </p:txBody>
+      </p:sp>
+      <p:sp>
+        <p:nvSpPr>
+          <p:cNvPr id="3" name="Date Placeholder 2"/>
+          <p:cNvSpPr>
+            <a:spLocks noGrp="1"/>
+          </p:cNvSpPr>
+          <p:nvPr>
+            <p:ph type="dt" idx="1"/>
+          </p:nvPr>
+        </p:nvSpPr>
+        <p:spPr>
+          <a:xfrm>
+            <a:off x="3884613" y="0"/>
+            <a:ext cx="2971800" cy="458788"/>
+          </a:xfrm>
+          <a:prstGeom prst="rect">
+            <a:avLst/>
+          </a:prstGeom>
+        </p:spPr>
+        <p:txBody>
+          <a:bodyPr vert="horz" lIns="91440" tIns="45720" rIns="91440" bIns="45720" rtlCol="0"/>
+          <a:lstStyle>
+            <a:lvl1pPr algn="r">
+              <a:defRPr sz="1200"/>
+            </a:lvl1pPr>
+          </a:lstStyle>
+          <a:p>
+            <a:fld id="{394F2DF0-07A6-104D-80A1-8DD44057934A}" type="datetimeFigureOut">
+              <a:rPr lang="en-US" smtClean="0"/>
+              <a:t>2/25/17</a:t>
+            </a:fld>
+            <a:endParaRPr lang="en-US"/>
+          </a:p>
+        </p:txBody>
+      </p:sp>
+      <p:sp>
+        <p:nvSpPr>
+          <p:cNvPr id="4" name="Slide Image Placeholder 3"/>
+          <p:cNvSpPr>
+            <a:spLocks noGrp="1" noRot="1" noChangeAspect="1"/>
+          </p:cNvSpPr>
+          <p:nvPr>
+            <p:ph type="sldImg" idx="2"/>
+          </p:nvPr>
+        </p:nvSpPr>
+        <p:spPr>
+          <a:xfrm>
+            <a:off x="685800" y="1143000"/>
+            <a:ext cx="5486400" cy="3086100"/>
+          </a:xfrm>
+          <a:prstGeom prst="rect">
+            <a:avLst/>
+          </a:prstGeom>
+          <a:noFill/>
+          <a:ln w="12700">
+            <a:solidFill>
+              <a:prstClr val="black"/>
+            </a:solidFill>
+          </a:ln>
+        </p:spPr>
+        <p:txBody>
+          <a:bodyPr vert="horz" lIns="91440" tIns="45720" rIns="91440" bIns="45720" rtlCol="0" anchor="ctr"/>
+          <a:lstStyle/>
+          <a:p>
+            <a:endParaRPr lang="en-US"/>
+          </a:p>
+        </p:txBody>
+      </p:sp>
+      <p:sp>
+        <p:nvSpPr>
+          <p:cNvPr id="5" name="Notes Placeholder 4"/>
+          <p:cNvSpPr>
+            <a:spLocks noGrp="1"/>
+          </p:cNvSpPr>
+          <p:nvPr>
+            <p:ph type="body" sz="quarter" idx="3"/>
+          </p:nvPr>
+        </p:nvSpPr>
+        <p:spPr>
+          <a:xfrm>
+            <a:off x="685800" y="4400550"/>
+            <a:ext cx="5486400" cy="3600450"/>
+          </a:xfrm>
+          <a:prstGeom prst="rect">
+            <a:avLst/>
+          </a:prstGeom>
+        </p:spPr>
+        <p:txBody>
+          <a:bodyPr vert="horz" lIns="91440" tIns="45720" rIns="91440" bIns="45720" rtlCol="0"/>
+          <a:lstStyle/>
+          <a:p>
+            <a:pPr lvl="0"/>
+            <a:r>
+              <a:rPr lang="en-US" smtClean="0"/>
+              <a:t>Click to edit Master text styles</a:t>
+            </a:r>
+          </a:p>
+          <a:p>
+            <a:pPr lvl="1"/>
+            <a:r>
+              <a:rPr lang="en-US" smtClean="0"/>
+              <a:t>Second level</a:t>
+            </a:r>
+          </a:p>
+          <a:p>
+            <a:pPr lvl="2"/>
+            <a:r>
+              <a:rPr lang="en-US" smtClean="0"/>
+              <a:t>Third level</a:t>
+            </a:r>
+          </a:p>
+          <a:p>
+            <a:pPr lvl="3"/>
+            <a:r>
+              <a:rPr lang="en-US" smtClean="0"/>
+              <a:t>Fourth level</a:t>
+            </a:r>
+          </a:p>
+          <a:p>
+            <a:pPr lvl="4"/>
+            <a:r>
+              <a:rPr lang="en-US" smtClean="0"/>
+              <a:t>Fifth level</a:t>
+            </a:r>
+            <a:endParaRPr lang="en-US"/>
+          </a:p>
+        </p:txBody>
+      </p:sp>
+      <p:sp>
+        <p:nvSpPr>
+          <p:cNvPr id="6" name="Footer Placeholder 5"/>
+          <p:cNvSpPr>
+            <a:spLocks noGrp="1"/>
+          </p:cNvSpPr>
+          <p:nvPr>
+            <p:ph type="ftr" sz="quarter" idx="4"/>
+          </p:nvPr>
+        </p:nvSpPr>
+        <p:spPr>
+          <a:xfrm>
+            <a:off x="0" y="8685213"/>
+            <a:ext cx="2971800" cy="458787"/>
+          </a:xfrm>
+          <a:prstGeom prst="rect">
+            <a:avLst/>
+          </a:prstGeom>
+        </p:spPr>
+        <p:txBody>
+          <a:bodyPr vert="horz" lIns="91440" tIns="45720" rIns="91440" bIns="45720" rtlCol="0" anchor="b"/>
+          <a:lstStyle>
+            <a:lvl1pPr algn="l">
+              <a:defRPr sz="1200"/>
+            </a:lvl1pPr>
+          </a:lstStyle>
+          <a:p>
+            <a:endParaRPr lang="en-US"/>
+          </a:p>
+        </p:txBody>
+      </p:sp>
+      <p:sp>
+        <p:nvSpPr>
+          <p:cNvPr id="7" name="Slide Number Placeholder 6"/>
+          <p:cNvSpPr>
+            <a:spLocks noGrp="1"/>
+          </p:cNvSpPr>
+          <p:nvPr>
+            <p:ph type="sldNum" sz="quarter" idx="5"/>
+          </p:nvPr>
+        </p:nvSpPr>
+        <p:spPr>
+          <a:xfrm>
+            <a:off x="3884613" y="8685213"/>
+            <a:ext cx="2971800" cy="458787"/>
+          </a:xfrm>
+          <a:prstGeom prst="rect">
+            <a:avLst/>
+          </a:prstGeom>
+        </p:spPr>
+        <p:txBody>
+          <a:bodyPr vert="horz" lIns="91440" tIns="45720" rIns="91440" bIns="45720" rtlCol="0" anchor="b"/>
+          <a:lstStyle>
+            <a:lvl1pPr algn="r">
+              <a:defRPr sz="1200"/>
+            </a:lvl1pPr>
+          </a:lstStyle>
+          <a:p>
+            <a:fld id="{A797F1E7-BF6F-6345-90E3-0655CB555F84}" type="slidenum">
+              <a:rPr lang="en-US" smtClean="0"/>
+              <a:t>‹#›</a:t>
+            </a:fld>
+            <a:endParaRPr lang="en-US"/>
+          </a:p>
+        </p:txBody>
+      </p:sp>
+    </p:spTree>
+    <p:extLst>
+      <p:ext uri="{BB962C8B-B14F-4D97-AF65-F5344CB8AC3E}">
+        <p14:creationId xmlns:p14="http://schemas.microsoft.com/office/powerpoint/2010/main" val="1209722035"/>
+      </p:ext>
+    </p:extLst>
+  </p:cSld>
+  <p:clrMap bg1="lt1" tx1="dk1" bg2="lt2" tx2="dk2" accent1="accent1" accent2="accent2" accent3="accent3" accent4="accent4" accent5="accent5" accent6="accent6" hlink="hlink" folHlink="folHlink"/>
+  <p:notesStyle>
+    <a:lvl1pPr marL="0" algn="l" defTabSz="914400" rtl="0" eaLnBrk="1" latinLnBrk="0" hangingPunct="1">
+      <a:defRPr sz="1200" kern="1200">
+        <a:solidFill>
+          <a:schemeClr val="tx1"/>
+        </a:solidFill>
+        <a:latin typeface="+mn-lt"/>
+        <a:ea typeface="+mn-ea"/>
+        <a:cs typeface="+mn-cs"/>
+      </a:defRPr>
+    </a:lvl1pPr>
+    <a:lvl2pPr marL="457200" algn="l" defTabSz="914400" rtl="0" eaLnBrk="1" latinLnBrk="0" hangingPunct="1">
+      <a:defRPr sz="1200" kern="1200">
+        <a:solidFill>
+          <a:schemeClr val="tx1"/>
+        </a:solidFill>
+        <a:latin typeface="+mn-lt"/>
+        <a:ea typeface="+mn-ea"/>
+        <a:cs typeface="+mn-cs"/>
+      </a:defRPr>
+    </a:lvl2pPr>
+    <a:lvl3pPr marL="914400" algn="l" defTabSz="914400" rtl="0" eaLnBrk="1" latinLnBrk="0" hangingPunct="1">
+      <a:defRPr sz="1200" kern="1200">
+        <a:solidFill>
+          <a:schemeClr val="tx1"/>
+        </a:solidFill>
+        <a:latin typeface="+mn-lt"/>
+        <a:ea typeface="+mn-ea"/>
+        <a:cs typeface="+mn-cs"/>
+      </a:defRPr>
+    </a:lvl3pPr>
+    <a:lvl4pPr marL="1371600" algn="l" defTabSz="914400" rtl="0" eaLnBrk="1" latinLnBrk="0" hangingPunct="1">
+      <a:defRPr sz="1200" kern="1200">
+        <a:solidFill>
+          <a:schemeClr val="tx1"/>
+        </a:solidFill>
+        <a:latin typeface="+mn-lt"/>
+        <a:ea typeface="+mn-ea"/>
+        <a:cs typeface="+mn-cs"/>
+      </a:defRPr>
+    </a:lvl4pPr>
+    <a:lvl5pPr marL="1828800" algn="l" defTabSz="914400" rtl="0" eaLnBrk="1" latinLnBrk="0" hangingPunct="1">
+      <a:defRPr sz="1200" kern="1200">
+        <a:solidFill>
+          <a:schemeClr val="tx1"/>
+        </a:solidFill>
+        <a:latin typeface="+mn-lt"/>
+        <a:ea typeface="+mn-ea"/>
+        <a:cs typeface="+mn-cs"/>
+      </a:defRPr>
+    </a:lvl5pPr>
+    <a:lvl6pPr marL="2286000" algn="l" defTabSz="914400" rtl="0" eaLnBrk="1" latinLnBrk="0" hangingPunct="1">
+      <a:defRPr sz="1200" kern="1200">
+        <a:solidFill>
+          <a:schemeClr val="tx1"/>
+        </a:solidFill>
+        <a:latin typeface="+mn-lt"/>
+        <a:ea typeface="+mn-ea"/>
+        <a:cs typeface="+mn-cs"/>
+      </a:defRPr>
+    </a:lvl6pPr>
+    <a:lvl7pPr marL="2743200" algn="l" defTabSz="914400" rtl="0" eaLnBrk="1" latinLnBrk="0" hangingPunct="1">
+      <a:defRPr sz="1200" kern="1200">
+        <a:solidFill>
+          <a:schemeClr val="tx1"/>
+        </a:solidFill>
+        <a:latin typeface="+mn-lt"/>
+        <a:ea typeface="+mn-ea"/>
+        <a:cs typeface="+mn-cs"/>
+      </a:defRPr>
+    </a:lvl7pPr>
+    <a:lvl8pPr marL="3200400" algn="l" defTabSz="914400" rtl="0" eaLnBrk="1" latinLnBrk="0" hangingPunct="1">
+      <a:defRPr sz="1200" kern="1200">
+        <a:solidFill>
+          <a:schemeClr val="tx1"/>
+        </a:solidFill>
+        <a:latin typeface="+mn-lt"/>
+        <a:ea typeface="+mn-ea"/>
+        <a:cs typeface="+mn-cs"/>
+      </a:defRPr>
+    </a:lvl8pPr>
+    <a:lvl9pPr marL="3657600" algn="l" defTabSz="914400" rtl="0" eaLnBrk="1" latinLnBrk="0" hangingPunct="1">
+      <a:defRPr sz="1200" kern="1200">
+        <a:solidFill>
+          <a:schemeClr val="tx1"/>
+        </a:solidFill>
+        <a:latin typeface="+mn-lt"/>
+        <a:ea typeface="+mn-ea"/>
+        <a:cs typeface="+mn-cs"/>
+      </a:defRPr>
+    </a:lvl9pPr>
+  </p:notesStyle>
+</p:notesMaster>
+</file>
+
 <file path=ppt/slideLayouts/slideLayout1.xml><?xml version="1.0" encoding="utf-8"?>
 <p:sldLayout xmlns:a="http://schemas.openxmlformats.org/drawingml/2006/main" xmlns:r="http://schemas.openxmlformats.org/officeDocument/2006/relationships" xmlns:p="http://schemas.openxmlformats.org/presentationml/2006/main" type="title" preserve="1">
   <p:cSld name="Title Slide">
@@ -249,7 +629,7 @@
           <a:p>
             <a:fld id="{D3E71D5E-8525-F341-91C6-9A560A6DCEB6}" type="datetimeFigureOut">
               <a:rPr lang="en-US" smtClean="0"/>
-              <a:t>2/24/2017</a:t>
+              <a:t>2/25/17</a:t>
             </a:fld>
             <a:endParaRPr lang="en-US"/>
           </a:p>
@@ -419,7 +799,7 @@
           <a:p>
             <a:fld id="{D3E71D5E-8525-F341-91C6-9A560A6DCEB6}" type="datetimeFigureOut">
               <a:rPr lang="en-US" smtClean="0"/>
-              <a:t>2/24/2017</a:t>
+              <a:t>2/25/17</a:t>
             </a:fld>
             <a:endParaRPr lang="en-US"/>
           </a:p>
@@ -599,7 +979,7 @@
           <a:p>
             <a:fld id="{D3E71D5E-8525-F341-91C6-9A560A6DCEB6}" type="datetimeFigureOut">
               <a:rPr lang="en-US" smtClean="0"/>
-              <a:t>2/24/2017</a:t>
+              <a:t>2/25/17</a:t>
             </a:fld>
             <a:endParaRPr lang="en-US"/>
           </a:p>
@@ -769,7 +1149,7 @@
           <a:p>
             <a:fld id="{D3E71D5E-8525-F341-91C6-9A560A6DCEB6}" type="datetimeFigureOut">
               <a:rPr lang="en-US" smtClean="0"/>
-              <a:t>2/24/2017</a:t>
+              <a:t>2/25/17</a:t>
             </a:fld>
             <a:endParaRPr lang="en-US"/>
           </a:p>
@@ -1015,7 +1395,7 @@
           <a:p>
             <a:fld id="{D3E71D5E-8525-F341-91C6-9A560A6DCEB6}" type="datetimeFigureOut">
               <a:rPr lang="en-US" smtClean="0"/>
-              <a:t>2/24/2017</a:t>
+              <a:t>2/25/17</a:t>
             </a:fld>
             <a:endParaRPr lang="en-US"/>
           </a:p>
@@ -1247,7 +1627,7 @@
           <a:p>
             <a:fld id="{D3E71D5E-8525-F341-91C6-9A560A6DCEB6}" type="datetimeFigureOut">
               <a:rPr lang="en-US" smtClean="0"/>
-              <a:t>2/24/2017</a:t>
+              <a:t>2/25/17</a:t>
             </a:fld>
             <a:endParaRPr lang="en-US"/>
           </a:p>
@@ -1614,7 +1994,7 @@
           <a:p>
             <a:fld id="{D3E71D5E-8525-F341-91C6-9A560A6DCEB6}" type="datetimeFigureOut">
               <a:rPr lang="en-US" smtClean="0"/>
-              <a:t>2/24/2017</a:t>
+              <a:t>2/25/17</a:t>
             </a:fld>
             <a:endParaRPr lang="en-US"/>
           </a:p>
@@ -1732,7 +2112,7 @@
           <a:p>
             <a:fld id="{D3E71D5E-8525-F341-91C6-9A560A6DCEB6}" type="datetimeFigureOut">
               <a:rPr lang="en-US" smtClean="0"/>
-              <a:t>2/24/2017</a:t>
+              <a:t>2/25/17</a:t>
             </a:fld>
             <a:endParaRPr lang="en-US"/>
           </a:p>
@@ -1827,7 +2207,7 @@
           <a:p>
             <a:fld id="{D3E71D5E-8525-F341-91C6-9A560A6DCEB6}" type="datetimeFigureOut">
               <a:rPr lang="en-US" smtClean="0"/>
-              <a:t>2/24/2017</a:t>
+              <a:t>2/25/17</a:t>
             </a:fld>
             <a:endParaRPr lang="en-US"/>
           </a:p>
@@ -2104,7 +2484,7 @@
           <a:p>
             <a:fld id="{D3E71D5E-8525-F341-91C6-9A560A6DCEB6}" type="datetimeFigureOut">
               <a:rPr lang="en-US" smtClean="0"/>
-              <a:t>2/24/2017</a:t>
+              <a:t>2/25/17</a:t>
             </a:fld>
             <a:endParaRPr lang="en-US"/>
           </a:p>
@@ -2357,7 +2737,7 @@
           <a:p>
             <a:fld id="{D3E71D5E-8525-F341-91C6-9A560A6DCEB6}" type="datetimeFigureOut">
               <a:rPr lang="en-US" smtClean="0"/>
-              <a:t>2/24/2017</a:t>
+              <a:t>2/25/17</a:t>
             </a:fld>
             <a:endParaRPr lang="en-US"/>
           </a:p>
@@ -2570,7 +2950,7 @@
           <a:p>
             <a:fld id="{D3E71D5E-8525-F341-91C6-9A560A6DCEB6}" type="datetimeFigureOut">
               <a:rPr lang="en-US" smtClean="0"/>
-              <a:t>2/24/2017</a:t>
+              <a:t>2/25/17</a:t>
             </a:fld>
             <a:endParaRPr lang="en-US"/>
           </a:p>
@@ -3050,6 +3430,916 @@
 </p:sld>
 </file>
 
+<file path=ppt/slides/slide10.xml><?xml version="1.0" encoding="utf-8"?>
+<p:sld xmlns:a="http://schemas.openxmlformats.org/drawingml/2006/main" xmlns:r="http://schemas.openxmlformats.org/officeDocument/2006/relationships" xmlns:p="http://schemas.openxmlformats.org/presentationml/2006/main">
+  <p:cSld>
+    <p:spTree>
+      <p:nvGrpSpPr>
+        <p:cNvPr id="1" name=""/>
+        <p:cNvGrpSpPr/>
+        <p:nvPr/>
+      </p:nvGrpSpPr>
+      <p:grpSpPr>
+        <a:xfrm>
+          <a:off x="0" y="0"/>
+          <a:ext cx="0" cy="0"/>
+          <a:chOff x="0" y="0"/>
+          <a:chExt cx="0" cy="0"/>
+        </a:xfrm>
+      </p:grpSpPr>
+      <p:sp>
+        <p:nvSpPr>
+          <p:cNvPr id="2" name="Title 1"/>
+          <p:cNvSpPr>
+            <a:spLocks noGrp="1"/>
+          </p:cNvSpPr>
+          <p:nvPr>
+            <p:ph type="title"/>
+          </p:nvPr>
+        </p:nvSpPr>
+        <p:spPr/>
+        <p:txBody>
+          <a:bodyPr/>
+          <a:lstStyle/>
+          <a:p>
+            <a:r>
+              <a:rPr lang="en-US" dirty="0" smtClean="0"/>
+              <a:t>Simple Linear Regression</a:t>
+            </a:r>
+            <a:endParaRPr lang="en-US" dirty="0"/>
+          </a:p>
+        </p:txBody>
+      </p:sp>
+      <p:sp>
+        <p:nvSpPr>
+          <p:cNvPr id="3" name="Content Placeholder 2"/>
+          <p:cNvSpPr>
+            <a:spLocks noGrp="1"/>
+          </p:cNvSpPr>
+          <p:nvPr>
+            <p:ph idx="1"/>
+          </p:nvPr>
+        </p:nvSpPr>
+        <p:spPr/>
+        <p:txBody>
+          <a:bodyPr/>
+          <a:lstStyle/>
+          <a:p>
+            <a:r>
+              <a:rPr lang="en-US" dirty="0" smtClean="0"/>
+              <a:t>Confidence Intervals</a:t>
+            </a:r>
+          </a:p>
+          <a:p>
+            <a:endParaRPr lang="en-US" dirty="0"/>
+          </a:p>
+        </p:txBody>
+      </p:sp>
+    </p:spTree>
+    <p:extLst>
+      <p:ext uri="{BB962C8B-B14F-4D97-AF65-F5344CB8AC3E}">
+        <p14:creationId xmlns:p14="http://schemas.microsoft.com/office/powerpoint/2010/main" val="921437906"/>
+      </p:ext>
+    </p:extLst>
+  </p:cSld>
+  <p:clrMapOvr>
+    <a:masterClrMapping/>
+  </p:clrMapOvr>
+</p:sld>
+</file>
+
+<file path=ppt/slides/slide11.xml><?xml version="1.0" encoding="utf-8"?>
+<p:sld xmlns:a="http://schemas.openxmlformats.org/drawingml/2006/main" xmlns:r="http://schemas.openxmlformats.org/officeDocument/2006/relationships" xmlns:p="http://schemas.openxmlformats.org/presentationml/2006/main">
+  <p:cSld>
+    <p:spTree>
+      <p:nvGrpSpPr>
+        <p:cNvPr id="1" name=""/>
+        <p:cNvGrpSpPr/>
+        <p:nvPr/>
+      </p:nvGrpSpPr>
+      <p:grpSpPr>
+        <a:xfrm>
+          <a:off x="0" y="0"/>
+          <a:ext cx="0" cy="0"/>
+          <a:chOff x="0" y="0"/>
+          <a:chExt cx="0" cy="0"/>
+        </a:xfrm>
+      </p:grpSpPr>
+      <p:sp>
+        <p:nvSpPr>
+          <p:cNvPr id="2" name="Title 1"/>
+          <p:cNvSpPr>
+            <a:spLocks noGrp="1"/>
+          </p:cNvSpPr>
+          <p:nvPr>
+            <p:ph type="title"/>
+          </p:nvPr>
+        </p:nvSpPr>
+        <p:spPr/>
+        <p:txBody>
+          <a:bodyPr/>
+          <a:lstStyle/>
+          <a:p>
+            <a:r>
+              <a:rPr lang="en-US" dirty="0" smtClean="0"/>
+              <a:t>Simple Linear Regression</a:t>
+            </a:r>
+            <a:endParaRPr lang="en-US" dirty="0"/>
+          </a:p>
+        </p:txBody>
+      </p:sp>
+      <p:sp>
+        <p:nvSpPr>
+          <p:cNvPr id="3" name="Content Placeholder 2"/>
+          <p:cNvSpPr>
+            <a:spLocks noGrp="1"/>
+          </p:cNvSpPr>
+          <p:nvPr>
+            <p:ph idx="1"/>
+          </p:nvPr>
+        </p:nvSpPr>
+        <p:spPr/>
+        <p:txBody>
+          <a:bodyPr/>
+          <a:lstStyle/>
+          <a:p>
+            <a:r>
+              <a:rPr lang="en-US" dirty="0" smtClean="0"/>
+              <a:t>Predictions</a:t>
+            </a:r>
+          </a:p>
+          <a:p>
+            <a:endParaRPr lang="en-US" dirty="0"/>
+          </a:p>
+        </p:txBody>
+      </p:sp>
+    </p:spTree>
+    <p:extLst>
+      <p:ext uri="{BB962C8B-B14F-4D97-AF65-F5344CB8AC3E}">
+        <p14:creationId xmlns:p14="http://schemas.microsoft.com/office/powerpoint/2010/main" val="1854276099"/>
+      </p:ext>
+    </p:extLst>
+  </p:cSld>
+  <p:clrMapOvr>
+    <a:masterClrMapping/>
+  </p:clrMapOvr>
+</p:sld>
+</file>
+
+<file path=ppt/slides/slide12.xml><?xml version="1.0" encoding="utf-8"?>
+<p:sld xmlns:a="http://schemas.openxmlformats.org/drawingml/2006/main" xmlns:r="http://schemas.openxmlformats.org/officeDocument/2006/relationships" xmlns:p="http://schemas.openxmlformats.org/presentationml/2006/main">
+  <p:cSld>
+    <p:spTree>
+      <p:nvGrpSpPr>
+        <p:cNvPr id="1" name=""/>
+        <p:cNvGrpSpPr/>
+        <p:nvPr/>
+      </p:nvGrpSpPr>
+      <p:grpSpPr>
+        <a:xfrm>
+          <a:off x="0" y="0"/>
+          <a:ext cx="0" cy="0"/>
+          <a:chOff x="0" y="0"/>
+          <a:chExt cx="0" cy="0"/>
+        </a:xfrm>
+      </p:grpSpPr>
+      <p:sp>
+        <p:nvSpPr>
+          <p:cNvPr id="2" name="Title 1"/>
+          <p:cNvSpPr>
+            <a:spLocks noGrp="1"/>
+          </p:cNvSpPr>
+          <p:nvPr>
+            <p:ph type="title"/>
+          </p:nvPr>
+        </p:nvSpPr>
+        <p:spPr/>
+        <p:txBody>
+          <a:bodyPr/>
+          <a:lstStyle/>
+          <a:p>
+            <a:r>
+              <a:rPr lang="en-US" dirty="0" smtClean="0"/>
+              <a:t>Simple Linear Regression</a:t>
+            </a:r>
+            <a:endParaRPr lang="en-US" dirty="0"/>
+          </a:p>
+        </p:txBody>
+      </p:sp>
+      <p:sp>
+        <p:nvSpPr>
+          <p:cNvPr id="3" name="Content Placeholder 2"/>
+          <p:cNvSpPr>
+            <a:spLocks noGrp="1"/>
+          </p:cNvSpPr>
+          <p:nvPr>
+            <p:ph idx="1"/>
+          </p:nvPr>
+        </p:nvSpPr>
+        <p:spPr/>
+        <p:txBody>
+          <a:bodyPr/>
+          <a:lstStyle/>
+          <a:p>
+            <a:r>
+              <a:rPr lang="en-US" dirty="0" smtClean="0"/>
+              <a:t>Measuring the quality of fit</a:t>
+            </a:r>
+          </a:p>
+          <a:p>
+            <a:endParaRPr lang="en-US" dirty="0"/>
+          </a:p>
+        </p:txBody>
+      </p:sp>
+    </p:spTree>
+    <p:extLst>
+      <p:ext uri="{BB962C8B-B14F-4D97-AF65-F5344CB8AC3E}">
+        <p14:creationId xmlns:p14="http://schemas.microsoft.com/office/powerpoint/2010/main" val="1793571560"/>
+      </p:ext>
+    </p:extLst>
+  </p:cSld>
+  <p:clrMapOvr>
+    <a:masterClrMapping/>
+  </p:clrMapOvr>
+</p:sld>
+</file>
+
+<file path=ppt/slides/slide13.xml><?xml version="1.0" encoding="utf-8"?>
+<p:sld xmlns:a="http://schemas.openxmlformats.org/drawingml/2006/main" xmlns:r="http://schemas.openxmlformats.org/officeDocument/2006/relationships" xmlns:p="http://schemas.openxmlformats.org/presentationml/2006/main">
+  <p:cSld>
+    <p:spTree>
+      <p:nvGrpSpPr>
+        <p:cNvPr id="1" name=""/>
+        <p:cNvGrpSpPr/>
+        <p:nvPr/>
+      </p:nvGrpSpPr>
+      <p:grpSpPr>
+        <a:xfrm>
+          <a:off x="0" y="0"/>
+          <a:ext cx="0" cy="0"/>
+          <a:chOff x="0" y="0"/>
+          <a:chExt cx="0" cy="0"/>
+        </a:xfrm>
+      </p:grpSpPr>
+      <p:sp>
+        <p:nvSpPr>
+          <p:cNvPr id="2" name="Title 1"/>
+          <p:cNvSpPr>
+            <a:spLocks noGrp="1"/>
+          </p:cNvSpPr>
+          <p:nvPr>
+            <p:ph type="title"/>
+          </p:nvPr>
+        </p:nvSpPr>
+        <p:spPr/>
+        <p:txBody>
+          <a:bodyPr/>
+          <a:lstStyle/>
+          <a:p>
+            <a:r>
+              <a:rPr lang="en-US" dirty="0" smtClean="0"/>
+              <a:t>Simple Linear Regression</a:t>
+            </a:r>
+            <a:endParaRPr lang="en-US" dirty="0"/>
+          </a:p>
+        </p:txBody>
+      </p:sp>
+      <p:sp>
+        <p:nvSpPr>
+          <p:cNvPr id="3" name="Content Placeholder 2"/>
+          <p:cNvSpPr>
+            <a:spLocks noGrp="1"/>
+          </p:cNvSpPr>
+          <p:nvPr>
+            <p:ph idx="1"/>
+          </p:nvPr>
+        </p:nvSpPr>
+        <p:spPr/>
+        <p:txBody>
+          <a:bodyPr/>
+          <a:lstStyle/>
+          <a:p>
+            <a:r>
+              <a:rPr lang="en-US" dirty="0" smtClean="0"/>
+              <a:t>Measuring the quality of fit and Assumptions</a:t>
+            </a:r>
+          </a:p>
+          <a:p>
+            <a:endParaRPr lang="en-US" dirty="0"/>
+          </a:p>
+        </p:txBody>
+      </p:sp>
+    </p:spTree>
+    <p:extLst>
+      <p:ext uri="{BB962C8B-B14F-4D97-AF65-F5344CB8AC3E}">
+        <p14:creationId xmlns:p14="http://schemas.microsoft.com/office/powerpoint/2010/main" val="2021808213"/>
+      </p:ext>
+    </p:extLst>
+  </p:cSld>
+  <p:clrMapOvr>
+    <a:masterClrMapping/>
+  </p:clrMapOvr>
+</p:sld>
+</file>
+
+<file path=ppt/slides/slide14.xml><?xml version="1.0" encoding="utf-8"?>
+<p:sld xmlns:a="http://schemas.openxmlformats.org/drawingml/2006/main" xmlns:r="http://schemas.openxmlformats.org/officeDocument/2006/relationships" xmlns:p="http://schemas.openxmlformats.org/presentationml/2006/main">
+  <p:cSld>
+    <p:spTree>
+      <p:nvGrpSpPr>
+        <p:cNvPr id="1" name=""/>
+        <p:cNvGrpSpPr/>
+        <p:nvPr/>
+      </p:nvGrpSpPr>
+      <p:grpSpPr>
+        <a:xfrm>
+          <a:off x="0" y="0"/>
+          <a:ext cx="0" cy="0"/>
+          <a:chOff x="0" y="0"/>
+          <a:chExt cx="0" cy="0"/>
+        </a:xfrm>
+      </p:grpSpPr>
+      <p:sp>
+        <p:nvSpPr>
+          <p:cNvPr id="2" name="Title 1"/>
+          <p:cNvSpPr>
+            <a:spLocks noGrp="1"/>
+          </p:cNvSpPr>
+          <p:nvPr>
+            <p:ph type="title"/>
+          </p:nvPr>
+        </p:nvSpPr>
+        <p:spPr/>
+        <p:txBody>
+          <a:bodyPr/>
+          <a:lstStyle/>
+          <a:p>
+            <a:r>
+              <a:rPr lang="en-US" dirty="0" smtClean="0"/>
+              <a:t>Multiple Linear Regression</a:t>
+            </a:r>
+            <a:endParaRPr lang="en-US" dirty="0"/>
+          </a:p>
+        </p:txBody>
+      </p:sp>
+      <p:sp>
+        <p:nvSpPr>
+          <p:cNvPr id="3" name="Content Placeholder 2"/>
+          <p:cNvSpPr>
+            <a:spLocks noGrp="1"/>
+          </p:cNvSpPr>
+          <p:nvPr>
+            <p:ph idx="1"/>
+          </p:nvPr>
+        </p:nvSpPr>
+        <p:spPr/>
+        <p:txBody>
+          <a:bodyPr/>
+          <a:lstStyle/>
+          <a:p>
+            <a:r>
+              <a:rPr lang="en-US" dirty="0" smtClean="0"/>
+              <a:t>What is MLR and how it is different from SLR</a:t>
+            </a:r>
+          </a:p>
+          <a:p>
+            <a:r>
+              <a:rPr lang="en-US" dirty="0" smtClean="0"/>
+              <a:t>Parameter Estimation</a:t>
+            </a:r>
+          </a:p>
+          <a:p>
+            <a:r>
+              <a:rPr lang="en-US" dirty="0" smtClean="0"/>
+              <a:t>Interpretation of Regression Coefficients</a:t>
+            </a:r>
+          </a:p>
+          <a:p>
+            <a:endParaRPr lang="en-US" dirty="0"/>
+          </a:p>
+        </p:txBody>
+      </p:sp>
+    </p:spTree>
+    <p:extLst>
+      <p:ext uri="{BB962C8B-B14F-4D97-AF65-F5344CB8AC3E}">
+        <p14:creationId xmlns:p14="http://schemas.microsoft.com/office/powerpoint/2010/main" val="218856761"/>
+      </p:ext>
+    </p:extLst>
+  </p:cSld>
+  <p:clrMapOvr>
+    <a:masterClrMapping/>
+  </p:clrMapOvr>
+</p:sld>
+</file>
+
+<file path=ppt/slides/slide15.xml><?xml version="1.0" encoding="utf-8"?>
+<p:sld xmlns:a="http://schemas.openxmlformats.org/drawingml/2006/main" xmlns:r="http://schemas.openxmlformats.org/officeDocument/2006/relationships" xmlns:p="http://schemas.openxmlformats.org/presentationml/2006/main">
+  <p:cSld>
+    <p:spTree>
+      <p:nvGrpSpPr>
+        <p:cNvPr id="1" name=""/>
+        <p:cNvGrpSpPr/>
+        <p:nvPr/>
+      </p:nvGrpSpPr>
+      <p:grpSpPr>
+        <a:xfrm>
+          <a:off x="0" y="0"/>
+          <a:ext cx="0" cy="0"/>
+          <a:chOff x="0" y="0"/>
+          <a:chExt cx="0" cy="0"/>
+        </a:xfrm>
+      </p:grpSpPr>
+      <p:sp>
+        <p:nvSpPr>
+          <p:cNvPr id="2" name="Title 1"/>
+          <p:cNvSpPr>
+            <a:spLocks noGrp="1"/>
+          </p:cNvSpPr>
+          <p:nvPr>
+            <p:ph type="title"/>
+          </p:nvPr>
+        </p:nvSpPr>
+        <p:spPr/>
+        <p:txBody>
+          <a:bodyPr/>
+          <a:lstStyle/>
+          <a:p>
+            <a:r>
+              <a:rPr lang="en-US" dirty="0" smtClean="0"/>
+              <a:t>Multiple Linear Regression</a:t>
+            </a:r>
+            <a:endParaRPr lang="en-US" dirty="0"/>
+          </a:p>
+        </p:txBody>
+      </p:sp>
+      <p:sp>
+        <p:nvSpPr>
+          <p:cNvPr id="3" name="Content Placeholder 2"/>
+          <p:cNvSpPr>
+            <a:spLocks noGrp="1"/>
+          </p:cNvSpPr>
+          <p:nvPr>
+            <p:ph idx="1"/>
+          </p:nvPr>
+        </p:nvSpPr>
+        <p:spPr/>
+        <p:txBody>
+          <a:bodyPr/>
+          <a:lstStyle/>
+          <a:p>
+            <a:endParaRPr lang="en-US" dirty="0" smtClean="0"/>
+          </a:p>
+          <a:p>
+            <a:r>
+              <a:rPr lang="en-US" dirty="0" smtClean="0"/>
+              <a:t>Centering and Scaling</a:t>
+            </a:r>
+          </a:p>
+          <a:p>
+            <a:r>
+              <a:rPr lang="en-US" dirty="0" smtClean="0"/>
+              <a:t>Multiple Correlation Coefficient</a:t>
+            </a:r>
+            <a:endParaRPr lang="en-US" dirty="0"/>
+          </a:p>
+        </p:txBody>
+      </p:sp>
+    </p:spTree>
+    <p:extLst>
+      <p:ext uri="{BB962C8B-B14F-4D97-AF65-F5344CB8AC3E}">
+        <p14:creationId xmlns:p14="http://schemas.microsoft.com/office/powerpoint/2010/main" val="1479586503"/>
+      </p:ext>
+    </p:extLst>
+  </p:cSld>
+  <p:clrMapOvr>
+    <a:masterClrMapping/>
+  </p:clrMapOvr>
+</p:sld>
+</file>
+
+<file path=ppt/slides/slide16.xml><?xml version="1.0" encoding="utf-8"?>
+<p:sld xmlns:a="http://schemas.openxmlformats.org/drawingml/2006/main" xmlns:r="http://schemas.openxmlformats.org/officeDocument/2006/relationships" xmlns:p="http://schemas.openxmlformats.org/presentationml/2006/main">
+  <p:cSld>
+    <p:spTree>
+      <p:nvGrpSpPr>
+        <p:cNvPr id="1" name=""/>
+        <p:cNvGrpSpPr/>
+        <p:nvPr/>
+      </p:nvGrpSpPr>
+      <p:grpSpPr>
+        <a:xfrm>
+          <a:off x="0" y="0"/>
+          <a:ext cx="0" cy="0"/>
+          <a:chOff x="0" y="0"/>
+          <a:chExt cx="0" cy="0"/>
+        </a:xfrm>
+      </p:grpSpPr>
+      <p:sp>
+        <p:nvSpPr>
+          <p:cNvPr id="2" name="Title 1"/>
+          <p:cNvSpPr>
+            <a:spLocks noGrp="1"/>
+          </p:cNvSpPr>
+          <p:nvPr>
+            <p:ph type="title"/>
+          </p:nvPr>
+        </p:nvSpPr>
+        <p:spPr/>
+        <p:txBody>
+          <a:bodyPr/>
+          <a:lstStyle/>
+          <a:p>
+            <a:r>
+              <a:rPr lang="en-US" dirty="0" smtClean="0"/>
+              <a:t>Multiple Linear Regression</a:t>
+            </a:r>
+            <a:endParaRPr lang="en-US" dirty="0"/>
+          </a:p>
+        </p:txBody>
+      </p:sp>
+      <p:sp>
+        <p:nvSpPr>
+          <p:cNvPr id="3" name="Content Placeholder 2"/>
+          <p:cNvSpPr>
+            <a:spLocks noGrp="1"/>
+          </p:cNvSpPr>
+          <p:nvPr>
+            <p:ph idx="1"/>
+          </p:nvPr>
+        </p:nvSpPr>
+        <p:spPr/>
+        <p:txBody>
+          <a:bodyPr/>
+          <a:lstStyle/>
+          <a:p>
+            <a:endParaRPr lang="en-US" dirty="0" smtClean="0"/>
+          </a:p>
+          <a:p>
+            <a:r>
+              <a:rPr lang="en-US" dirty="0" smtClean="0"/>
+              <a:t>Tests of Hypothesis in a Linear Model</a:t>
+            </a:r>
+            <a:endParaRPr lang="en-US" dirty="0"/>
+          </a:p>
+        </p:txBody>
+      </p:sp>
+    </p:spTree>
+    <p:extLst>
+      <p:ext uri="{BB962C8B-B14F-4D97-AF65-F5344CB8AC3E}">
+        <p14:creationId xmlns:p14="http://schemas.microsoft.com/office/powerpoint/2010/main" val="1098192282"/>
+      </p:ext>
+    </p:extLst>
+  </p:cSld>
+  <p:clrMapOvr>
+    <a:masterClrMapping/>
+  </p:clrMapOvr>
+</p:sld>
+</file>
+
+<file path=ppt/slides/slide17.xml><?xml version="1.0" encoding="utf-8"?>
+<p:sld xmlns:a="http://schemas.openxmlformats.org/drawingml/2006/main" xmlns:r="http://schemas.openxmlformats.org/officeDocument/2006/relationships" xmlns:p="http://schemas.openxmlformats.org/presentationml/2006/main">
+  <p:cSld>
+    <p:spTree>
+      <p:nvGrpSpPr>
+        <p:cNvPr id="1" name=""/>
+        <p:cNvGrpSpPr/>
+        <p:nvPr/>
+      </p:nvGrpSpPr>
+      <p:grpSpPr>
+        <a:xfrm>
+          <a:off x="0" y="0"/>
+          <a:ext cx="0" cy="0"/>
+          <a:chOff x="0" y="0"/>
+          <a:chExt cx="0" cy="0"/>
+        </a:xfrm>
+      </p:grpSpPr>
+      <p:sp>
+        <p:nvSpPr>
+          <p:cNvPr id="2" name="Title 1"/>
+          <p:cNvSpPr>
+            <a:spLocks noGrp="1"/>
+          </p:cNvSpPr>
+          <p:nvPr>
+            <p:ph type="title"/>
+          </p:nvPr>
+        </p:nvSpPr>
+        <p:spPr/>
+        <p:txBody>
+          <a:bodyPr/>
+          <a:lstStyle/>
+          <a:p>
+            <a:r>
+              <a:rPr lang="en-US" dirty="0" smtClean="0"/>
+              <a:t>Multiple Linear Regression</a:t>
+            </a:r>
+            <a:endParaRPr lang="en-US" dirty="0"/>
+          </a:p>
+        </p:txBody>
+      </p:sp>
+      <p:sp>
+        <p:nvSpPr>
+          <p:cNvPr id="3" name="Content Placeholder 2"/>
+          <p:cNvSpPr>
+            <a:spLocks noGrp="1"/>
+          </p:cNvSpPr>
+          <p:nvPr>
+            <p:ph idx="1"/>
+          </p:nvPr>
+        </p:nvSpPr>
+        <p:spPr/>
+        <p:txBody>
+          <a:bodyPr/>
+          <a:lstStyle/>
+          <a:p>
+            <a:endParaRPr lang="en-US" dirty="0" smtClean="0"/>
+          </a:p>
+          <a:p>
+            <a:r>
+              <a:rPr lang="en-US" dirty="0" smtClean="0"/>
+              <a:t>Predictions</a:t>
+            </a:r>
+            <a:endParaRPr lang="en-US" dirty="0"/>
+          </a:p>
+        </p:txBody>
+      </p:sp>
+    </p:spTree>
+    <p:extLst>
+      <p:ext uri="{BB962C8B-B14F-4D97-AF65-F5344CB8AC3E}">
+        <p14:creationId xmlns:p14="http://schemas.microsoft.com/office/powerpoint/2010/main" val="902491110"/>
+      </p:ext>
+    </p:extLst>
+  </p:cSld>
+  <p:clrMapOvr>
+    <a:masterClrMapping/>
+  </p:clrMapOvr>
+</p:sld>
+</file>
+
+<file path=ppt/slides/slide18.xml><?xml version="1.0" encoding="utf-8"?>
+<p:sld xmlns:a="http://schemas.openxmlformats.org/drawingml/2006/main" xmlns:r="http://schemas.openxmlformats.org/officeDocument/2006/relationships" xmlns:p="http://schemas.openxmlformats.org/presentationml/2006/main">
+  <p:cSld>
+    <p:spTree>
+      <p:nvGrpSpPr>
+        <p:cNvPr id="1" name=""/>
+        <p:cNvGrpSpPr/>
+        <p:nvPr/>
+      </p:nvGrpSpPr>
+      <p:grpSpPr>
+        <a:xfrm>
+          <a:off x="0" y="0"/>
+          <a:ext cx="0" cy="0"/>
+          <a:chOff x="0" y="0"/>
+          <a:chExt cx="0" cy="0"/>
+        </a:xfrm>
+      </p:grpSpPr>
+      <p:sp>
+        <p:nvSpPr>
+          <p:cNvPr id="2" name="Title 1"/>
+          <p:cNvSpPr>
+            <a:spLocks noGrp="1"/>
+          </p:cNvSpPr>
+          <p:nvPr>
+            <p:ph type="title"/>
+          </p:nvPr>
+        </p:nvSpPr>
+        <p:spPr/>
+        <p:txBody>
+          <a:bodyPr/>
+          <a:lstStyle/>
+          <a:p>
+            <a:r>
+              <a:rPr lang="en-US" dirty="0" smtClean="0"/>
+              <a:t>Multiple Linear Regression</a:t>
+            </a:r>
+            <a:endParaRPr lang="en-US" dirty="0"/>
+          </a:p>
+        </p:txBody>
+      </p:sp>
+      <p:sp>
+        <p:nvSpPr>
+          <p:cNvPr id="3" name="Content Placeholder 2"/>
+          <p:cNvSpPr>
+            <a:spLocks noGrp="1"/>
+          </p:cNvSpPr>
+          <p:nvPr>
+            <p:ph idx="1"/>
+          </p:nvPr>
+        </p:nvSpPr>
+        <p:spPr/>
+        <p:txBody>
+          <a:bodyPr/>
+          <a:lstStyle/>
+          <a:p>
+            <a:endParaRPr lang="en-US" dirty="0" smtClean="0"/>
+          </a:p>
+          <a:p>
+            <a:r>
+              <a:rPr lang="en-US" dirty="0" smtClean="0"/>
+              <a:t>Matrix Notation</a:t>
+            </a:r>
+            <a:endParaRPr lang="en-US" dirty="0"/>
+          </a:p>
+        </p:txBody>
+      </p:sp>
+    </p:spTree>
+    <p:extLst>
+      <p:ext uri="{BB962C8B-B14F-4D97-AF65-F5344CB8AC3E}">
+        <p14:creationId xmlns:p14="http://schemas.microsoft.com/office/powerpoint/2010/main" val="1650475932"/>
+      </p:ext>
+    </p:extLst>
+  </p:cSld>
+  <p:clrMapOvr>
+    <a:masterClrMapping/>
+  </p:clrMapOvr>
+</p:sld>
+</file>
+
+<file path=ppt/slides/slide19.xml><?xml version="1.0" encoding="utf-8"?>
+<p:sld xmlns:a="http://schemas.openxmlformats.org/drawingml/2006/main" xmlns:r="http://schemas.openxmlformats.org/officeDocument/2006/relationships" xmlns:p="http://schemas.openxmlformats.org/presentationml/2006/main">
+  <p:cSld>
+    <p:spTree>
+      <p:nvGrpSpPr>
+        <p:cNvPr id="1" name=""/>
+        <p:cNvGrpSpPr/>
+        <p:nvPr/>
+      </p:nvGrpSpPr>
+      <p:grpSpPr>
+        <a:xfrm>
+          <a:off x="0" y="0"/>
+          <a:ext cx="0" cy="0"/>
+          <a:chOff x="0" y="0"/>
+          <a:chExt cx="0" cy="0"/>
+        </a:xfrm>
+      </p:grpSpPr>
+      <p:sp>
+        <p:nvSpPr>
+          <p:cNvPr id="2" name="Title 1"/>
+          <p:cNvSpPr>
+            <a:spLocks noGrp="1"/>
+          </p:cNvSpPr>
+          <p:nvPr>
+            <p:ph type="title"/>
+          </p:nvPr>
+        </p:nvSpPr>
+        <p:spPr/>
+        <p:txBody>
+          <a:bodyPr>
+            <a:normAutofit/>
+          </a:bodyPr>
+          <a:lstStyle/>
+          <a:p>
+            <a:r>
+              <a:rPr lang="en-US" dirty="0" smtClean="0"/>
+              <a:t>Regression Assumptions (</a:t>
+            </a:r>
+            <a:r>
+              <a:rPr lang="en-US" sz="1200" dirty="0" smtClean="0"/>
+              <a:t>Diagnostics(http</a:t>
+            </a:r>
+            <a:r>
+              <a:rPr lang="en-US" sz="1200" dirty="0"/>
+              <a:t>://</a:t>
+            </a:r>
+            <a:r>
+              <a:rPr lang="en-US" sz="1200" dirty="0" err="1"/>
+              <a:t>www.statmethods.net</a:t>
+            </a:r>
+            <a:r>
+              <a:rPr lang="en-US" sz="1200" dirty="0"/>
+              <a:t>/stats/</a:t>
+            </a:r>
+            <a:r>
+              <a:rPr lang="en-US" sz="1200" dirty="0" err="1"/>
+              <a:t>rdiagnostics.html</a:t>
+            </a:r>
+            <a:r>
+              <a:rPr lang="en-US" dirty="0"/>
+              <a:t>)</a:t>
+            </a:r>
+          </a:p>
+        </p:txBody>
+      </p:sp>
+      <p:sp>
+        <p:nvSpPr>
+          <p:cNvPr id="3" name="Content Placeholder 2"/>
+          <p:cNvSpPr>
+            <a:spLocks noGrp="1"/>
+          </p:cNvSpPr>
+          <p:nvPr>
+            <p:ph idx="1"/>
+          </p:nvPr>
+        </p:nvSpPr>
+        <p:spPr/>
+        <p:txBody>
+          <a:bodyPr/>
+          <a:lstStyle/>
+          <a:p>
+            <a:r>
+              <a:rPr lang="en-US" dirty="0" smtClean="0"/>
+              <a:t>Assumptions about the form of the model - Linearity</a:t>
+            </a:r>
+          </a:p>
+          <a:p>
+            <a:r>
+              <a:rPr lang="en-US" dirty="0" smtClean="0"/>
+              <a:t>Assumptions about the errors </a:t>
+            </a:r>
+            <a:r>
+              <a:rPr lang="mr-IN" dirty="0" smtClean="0"/>
+              <a:t>–</a:t>
+            </a:r>
+            <a:r>
+              <a:rPr lang="en-US" dirty="0" smtClean="0"/>
+              <a:t> Normality of the residuals</a:t>
+            </a:r>
+          </a:p>
+          <a:p>
+            <a:r>
+              <a:rPr lang="en-US" dirty="0" smtClean="0"/>
+              <a:t>Assumptions about the predictors - Multicollinearity</a:t>
+            </a:r>
+          </a:p>
+          <a:p>
+            <a:r>
+              <a:rPr lang="en-US" b="1" dirty="0" smtClean="0"/>
+              <a:t>Non-constant </a:t>
+            </a:r>
+            <a:r>
+              <a:rPr lang="en-US" b="1" dirty="0"/>
+              <a:t>Error </a:t>
+            </a:r>
+            <a:r>
+              <a:rPr lang="en-US" b="1" dirty="0" smtClean="0"/>
+              <a:t>Variance</a:t>
+            </a:r>
+            <a:r>
+              <a:rPr lang="en-US" dirty="0" smtClean="0"/>
+              <a:t> </a:t>
+            </a:r>
+            <a:r>
+              <a:rPr lang="mr-IN" dirty="0" smtClean="0"/>
+              <a:t>–</a:t>
+            </a:r>
+            <a:r>
+              <a:rPr lang="en-US" dirty="0" smtClean="0"/>
+              <a:t> </a:t>
+            </a:r>
+            <a:r>
+              <a:rPr lang="en-US" u="sng" dirty="0" smtClean="0"/>
+              <a:t>Homoscedasticity</a:t>
+            </a:r>
+          </a:p>
+          <a:p>
+            <a:r>
+              <a:rPr lang="en-US" dirty="0" smtClean="0"/>
+              <a:t>Outliers</a:t>
+            </a:r>
+          </a:p>
+          <a:p>
+            <a:r>
+              <a:rPr lang="en-US" dirty="0" smtClean="0"/>
+              <a:t>Influential observations</a:t>
+            </a:r>
+          </a:p>
+          <a:p>
+            <a:r>
+              <a:rPr lang="en-US" b="1" dirty="0" smtClean="0"/>
+              <a:t>Non-independence </a:t>
+            </a:r>
+            <a:r>
+              <a:rPr lang="en-US" b="1" dirty="0"/>
+              <a:t>of </a:t>
+            </a:r>
+            <a:r>
+              <a:rPr lang="en-US" b="1" dirty="0" smtClean="0"/>
+              <a:t>Errors - </a:t>
+            </a:r>
+            <a:r>
+              <a:rPr lang="en-US" dirty="0"/>
+              <a:t>Autocorrelation</a:t>
+            </a:r>
+          </a:p>
+          <a:p>
+            <a:endParaRPr lang="en-US" dirty="0" smtClean="0"/>
+          </a:p>
+          <a:p>
+            <a:endParaRPr lang="en-US" dirty="0"/>
+          </a:p>
+        </p:txBody>
+      </p:sp>
+    </p:spTree>
+    <p:extLst>
+      <p:ext uri="{BB962C8B-B14F-4D97-AF65-F5344CB8AC3E}">
+        <p14:creationId xmlns:p14="http://schemas.microsoft.com/office/powerpoint/2010/main" val="132111271"/>
+      </p:ext>
+    </p:extLst>
+  </p:cSld>
+  <p:clrMapOvr>
+    <a:masterClrMapping/>
+  </p:clrMapOvr>
+</p:sld>
+</file>
+
 <file path=ppt/slides/slide2.xml><?xml version="1.0" encoding="utf-8"?>
 <p:sld xmlns:a="http://schemas.openxmlformats.org/drawingml/2006/main" xmlns:r="http://schemas.openxmlformats.org/officeDocument/2006/relationships" xmlns:p="http://schemas.openxmlformats.org/presentationml/2006/main">
   <p:cSld>
@@ -3132,10 +4422,9 @@
           </a:p>
           <a:p>
             <a:r>
-              <a:rPr lang="en-US" dirty="0" err="1" smtClean="0"/>
-              <a:t>Meterology</a:t>
-            </a:r>
-            <a:endParaRPr lang="en-US" dirty="0" smtClean="0"/>
+              <a:rPr lang="en-US" dirty="0" smtClean="0"/>
+              <a:t>Meteorology</a:t>
+            </a:r>
           </a:p>
           <a:p>
             <a:r>
@@ -3188,6 +4477,1018 @@
     <p:extLst>
       <p:ext uri="{BB962C8B-B14F-4D97-AF65-F5344CB8AC3E}">
         <p14:creationId xmlns:p14="http://schemas.microsoft.com/office/powerpoint/2010/main" val="1668474250"/>
+      </p:ext>
+    </p:extLst>
+  </p:cSld>
+  <p:clrMapOvr>
+    <a:masterClrMapping/>
+  </p:clrMapOvr>
+</p:sld>
+</file>
+
+<file path=ppt/slides/slide20.xml><?xml version="1.0" encoding="utf-8"?>
+<p:sld xmlns:a="http://schemas.openxmlformats.org/drawingml/2006/main" xmlns:r="http://schemas.openxmlformats.org/officeDocument/2006/relationships" xmlns:p="http://schemas.openxmlformats.org/presentationml/2006/main">
+  <p:cSld>
+    <p:spTree>
+      <p:nvGrpSpPr>
+        <p:cNvPr id="1" name=""/>
+        <p:cNvGrpSpPr/>
+        <p:nvPr/>
+      </p:nvGrpSpPr>
+      <p:grpSpPr>
+        <a:xfrm>
+          <a:off x="0" y="0"/>
+          <a:ext cx="0" cy="0"/>
+          <a:chOff x="0" y="0"/>
+          <a:chExt cx="0" cy="0"/>
+        </a:xfrm>
+      </p:grpSpPr>
+      <p:sp>
+        <p:nvSpPr>
+          <p:cNvPr id="8" name="Rectangle 7"/>
+          <p:cNvSpPr>
+            <a:spLocks noGrp="1" noRot="1" noChangeAspect="1" noMove="1" noResize="1" noEditPoints="1" noAdjustHandles="1" noChangeArrowheads="1" noChangeShapeType="1" noTextEdit="1"/>
+          </p:cNvSpPr>
+          <p:nvPr>
+            <p:extLst>
+              <p:ext uri="{386F3935-93C4-4BCD-93E2-E3B085C9AB24}">
+                <p16:designElem xmlns:p16="http://schemas.microsoft.com/office/powerpoint/2015/main" val="1"/>
+              </p:ext>
+            </p:extLst>
+          </p:nvPr>
+        </p:nvSpPr>
+        <p:spPr bwMode="white">
+          <a:xfrm>
+            <a:off x="0" y="0"/>
+            <a:ext cx="12192000" cy="6858000"/>
+          </a:xfrm>
+          <a:prstGeom prst="rect">
+            <a:avLst/>
+          </a:prstGeom>
+          <a:solidFill>
+            <a:schemeClr val="bg1"/>
+          </a:solidFill>
+          <a:ln>
+            <a:noFill/>
+          </a:ln>
+          <a:effectLst/>
+        </p:spPr>
+      </p:sp>
+      <p:pic>
+        <p:nvPicPr>
+          <p:cNvPr id="4" name="Picture 3"/>
+          <p:cNvPicPr>
+            <a:picLocks noChangeAspect="1"/>
+          </p:cNvPicPr>
+          <p:nvPr/>
+        </p:nvPicPr>
+        <p:blipFill>
+          <a:blip r:embed="rId2"/>
+          <a:stretch>
+            <a:fillRect/>
+          </a:stretch>
+        </p:blipFill>
+        <p:spPr>
+          <a:xfrm>
+            <a:off x="4061860" y="1123527"/>
+            <a:ext cx="6139733" cy="4604800"/>
+          </a:xfrm>
+          <a:prstGeom prst="rect">
+            <a:avLst/>
+          </a:prstGeom>
+        </p:spPr>
+      </p:pic>
+      <p:cxnSp>
+        <p:nvCxnSpPr>
+          <p:cNvPr id="10" name="Straight Connector 9"/>
+          <p:cNvCxnSpPr>
+            <a:cxnSpLocks noGrp="1" noRot="1" noChangeAspect="1" noMove="1" noResize="1" noEditPoints="1" noAdjustHandles="1" noChangeArrowheads="1" noChangeShapeType="1"/>
+          </p:cNvCxnSpPr>
+          <p:nvPr>
+            <p:extLst>
+              <p:ext uri="{386F3935-93C4-4BCD-93E2-E3B085C9AB24}">
+                <p16:designElem xmlns:p16="http://schemas.microsoft.com/office/powerpoint/2015/main" val="1"/>
+              </p:ext>
+            </p:extLst>
+          </p:nvPr>
+        </p:nvCxnSpPr>
+        <p:spPr>
+          <a:xfrm>
+            <a:off x="3738202" y="1570814"/>
+            <a:ext cx="0" cy="3710227"/>
+          </a:xfrm>
+          <a:prstGeom prst="line">
+            <a:avLst/>
+          </a:prstGeom>
+          <a:ln w="19050"/>
+        </p:spPr>
+        <p:style>
+          <a:lnRef idx="1">
+            <a:schemeClr val="accent1"/>
+          </a:lnRef>
+          <a:fillRef idx="0">
+            <a:schemeClr val="accent1"/>
+          </a:fillRef>
+          <a:effectRef idx="0">
+            <a:schemeClr val="accent1"/>
+          </a:effectRef>
+          <a:fontRef idx="minor">
+            <a:schemeClr val="tx1"/>
+          </a:fontRef>
+        </p:style>
+      </p:cxnSp>
+      <p:sp>
+        <p:nvSpPr>
+          <p:cNvPr id="2" name="TextBox 1"/>
+          <p:cNvSpPr txBox="1"/>
+          <p:nvPr/>
+        </p:nvSpPr>
+        <p:spPr>
+          <a:xfrm>
+            <a:off x="2243138" y="357188"/>
+            <a:ext cx="5643562" cy="369332"/>
+          </a:xfrm>
+          <a:prstGeom prst="rect">
+            <a:avLst/>
+          </a:prstGeom>
+          <a:noFill/>
+        </p:spPr>
+        <p:txBody>
+          <a:bodyPr wrap="square" rtlCol="0">
+            <a:spAutoFit/>
+          </a:bodyPr>
+          <a:lstStyle/>
+          <a:p>
+            <a:r>
+              <a:rPr lang="en-US" dirty="0" smtClean="0"/>
+              <a:t>Homoscedasticity</a:t>
+            </a:r>
+            <a:endParaRPr lang="en-US" dirty="0"/>
+          </a:p>
+        </p:txBody>
+      </p:sp>
+    </p:spTree>
+    <p:extLst>
+      <p:ext uri="{BB962C8B-B14F-4D97-AF65-F5344CB8AC3E}">
+        <p14:creationId xmlns:p14="http://schemas.microsoft.com/office/powerpoint/2010/main" val="2913854552"/>
+      </p:ext>
+    </p:extLst>
+  </p:cSld>
+  <p:clrMapOvr>
+    <a:masterClrMapping/>
+  </p:clrMapOvr>
+</p:sld>
+</file>
+
+<file path=ppt/slides/slide21.xml><?xml version="1.0" encoding="utf-8"?>
+<p:sld xmlns:a="http://schemas.openxmlformats.org/drawingml/2006/main" xmlns:r="http://schemas.openxmlformats.org/officeDocument/2006/relationships" xmlns:p="http://schemas.openxmlformats.org/presentationml/2006/main">
+  <p:cSld>
+    <p:spTree>
+      <p:nvGrpSpPr>
+        <p:cNvPr id="1" name=""/>
+        <p:cNvGrpSpPr/>
+        <p:nvPr/>
+      </p:nvGrpSpPr>
+      <p:grpSpPr>
+        <a:xfrm>
+          <a:off x="0" y="0"/>
+          <a:ext cx="0" cy="0"/>
+          <a:chOff x="0" y="0"/>
+          <a:chExt cx="0" cy="0"/>
+        </a:xfrm>
+      </p:grpSpPr>
+      <p:pic>
+        <p:nvPicPr>
+          <p:cNvPr id="4" name="Picture 3"/>
+          <p:cNvPicPr>
+            <a:picLocks noChangeAspect="1"/>
+          </p:cNvPicPr>
+          <p:nvPr/>
+        </p:nvPicPr>
+        <p:blipFill>
+          <a:blip r:embed="rId2"/>
+          <a:stretch>
+            <a:fillRect/>
+          </a:stretch>
+        </p:blipFill>
+        <p:spPr>
+          <a:xfrm>
+            <a:off x="1524000" y="742950"/>
+            <a:ext cx="9144000" cy="6115050"/>
+          </a:xfrm>
+          <a:prstGeom prst="rect">
+            <a:avLst/>
+          </a:prstGeom>
+        </p:spPr>
+      </p:pic>
+      <p:sp>
+        <p:nvSpPr>
+          <p:cNvPr id="5" name="TextBox 4"/>
+          <p:cNvSpPr txBox="1"/>
+          <p:nvPr/>
+        </p:nvSpPr>
+        <p:spPr>
+          <a:xfrm>
+            <a:off x="2243138" y="357188"/>
+            <a:ext cx="5643562" cy="369332"/>
+          </a:xfrm>
+          <a:prstGeom prst="rect">
+            <a:avLst/>
+          </a:prstGeom>
+          <a:noFill/>
+        </p:spPr>
+        <p:txBody>
+          <a:bodyPr wrap="square" rtlCol="0">
+            <a:spAutoFit/>
+          </a:bodyPr>
+          <a:lstStyle/>
+          <a:p>
+            <a:r>
+              <a:rPr lang="en-US" dirty="0" smtClean="0"/>
+              <a:t>Homoscedasticity</a:t>
+            </a:r>
+            <a:endParaRPr lang="en-US" dirty="0"/>
+          </a:p>
+        </p:txBody>
+      </p:sp>
+    </p:spTree>
+    <p:extLst>
+      <p:ext uri="{BB962C8B-B14F-4D97-AF65-F5344CB8AC3E}">
+        <p14:creationId xmlns:p14="http://schemas.microsoft.com/office/powerpoint/2010/main" val="1570556096"/>
+      </p:ext>
+    </p:extLst>
+  </p:cSld>
+  <p:clrMapOvr>
+    <a:masterClrMapping/>
+  </p:clrMapOvr>
+</p:sld>
+</file>
+
+<file path=ppt/slides/slide22.xml><?xml version="1.0" encoding="utf-8"?>
+<p:sld xmlns:a="http://schemas.openxmlformats.org/drawingml/2006/main" xmlns:r="http://schemas.openxmlformats.org/officeDocument/2006/relationships" xmlns:p="http://schemas.openxmlformats.org/presentationml/2006/main">
+  <p:cSld>
+    <p:spTree>
+      <p:nvGrpSpPr>
+        <p:cNvPr id="1" name=""/>
+        <p:cNvGrpSpPr/>
+        <p:nvPr/>
+      </p:nvGrpSpPr>
+      <p:grpSpPr>
+        <a:xfrm>
+          <a:off x="0" y="0"/>
+          <a:ext cx="0" cy="0"/>
+          <a:chOff x="0" y="0"/>
+          <a:chExt cx="0" cy="0"/>
+        </a:xfrm>
+      </p:grpSpPr>
+      <p:pic>
+        <p:nvPicPr>
+          <p:cNvPr id="4" name="Picture 3"/>
+          <p:cNvPicPr>
+            <a:picLocks noChangeAspect="1"/>
+          </p:cNvPicPr>
+          <p:nvPr/>
+        </p:nvPicPr>
+        <p:blipFill>
+          <a:blip r:embed="rId2"/>
+          <a:stretch>
+            <a:fillRect/>
+          </a:stretch>
+        </p:blipFill>
+        <p:spPr>
+          <a:xfrm>
+            <a:off x="1524000" y="914400"/>
+            <a:ext cx="9144000" cy="5943600"/>
+          </a:xfrm>
+          <a:prstGeom prst="rect">
+            <a:avLst/>
+          </a:prstGeom>
+        </p:spPr>
+      </p:pic>
+      <p:sp>
+        <p:nvSpPr>
+          <p:cNvPr id="5" name="TextBox 4"/>
+          <p:cNvSpPr txBox="1"/>
+          <p:nvPr/>
+        </p:nvSpPr>
+        <p:spPr>
+          <a:xfrm>
+            <a:off x="2243138" y="357188"/>
+            <a:ext cx="5643562" cy="369332"/>
+          </a:xfrm>
+          <a:prstGeom prst="rect">
+            <a:avLst/>
+          </a:prstGeom>
+          <a:noFill/>
+        </p:spPr>
+        <p:txBody>
+          <a:bodyPr wrap="square" rtlCol="0">
+            <a:spAutoFit/>
+          </a:bodyPr>
+          <a:lstStyle/>
+          <a:p>
+            <a:r>
+              <a:rPr lang="en-US" dirty="0" smtClean="0"/>
+              <a:t>Homoscedasticity</a:t>
+            </a:r>
+            <a:endParaRPr lang="en-US" dirty="0"/>
+          </a:p>
+        </p:txBody>
+      </p:sp>
+    </p:spTree>
+    <p:extLst>
+      <p:ext uri="{BB962C8B-B14F-4D97-AF65-F5344CB8AC3E}">
+        <p14:creationId xmlns:p14="http://schemas.microsoft.com/office/powerpoint/2010/main" val="938133295"/>
+      </p:ext>
+    </p:extLst>
+  </p:cSld>
+  <p:clrMapOvr>
+    <a:masterClrMapping/>
+  </p:clrMapOvr>
+</p:sld>
+</file>
+
+<file path=ppt/slides/slide23.xml><?xml version="1.0" encoding="utf-8"?>
+<p:sld xmlns:a="http://schemas.openxmlformats.org/drawingml/2006/main" xmlns:r="http://schemas.openxmlformats.org/officeDocument/2006/relationships" xmlns:p="http://schemas.openxmlformats.org/presentationml/2006/main">
+  <p:cSld>
+    <p:spTree>
+      <p:nvGrpSpPr>
+        <p:cNvPr id="1" name=""/>
+        <p:cNvGrpSpPr/>
+        <p:nvPr/>
+      </p:nvGrpSpPr>
+      <p:grpSpPr>
+        <a:xfrm>
+          <a:off x="0" y="0"/>
+          <a:ext cx="0" cy="0"/>
+          <a:chOff x="0" y="0"/>
+          <a:chExt cx="0" cy="0"/>
+        </a:xfrm>
+      </p:grpSpPr>
+      <p:pic>
+        <p:nvPicPr>
+          <p:cNvPr id="4" name="Picture 3"/>
+          <p:cNvPicPr>
+            <a:picLocks noChangeAspect="1"/>
+          </p:cNvPicPr>
+          <p:nvPr/>
+        </p:nvPicPr>
+        <p:blipFill>
+          <a:blip r:embed="rId2"/>
+          <a:stretch>
+            <a:fillRect/>
+          </a:stretch>
+        </p:blipFill>
+        <p:spPr>
+          <a:xfrm>
+            <a:off x="1524000" y="885824"/>
+            <a:ext cx="9144000" cy="5972175"/>
+          </a:xfrm>
+          <a:prstGeom prst="rect">
+            <a:avLst/>
+          </a:prstGeom>
+        </p:spPr>
+      </p:pic>
+      <p:sp>
+        <p:nvSpPr>
+          <p:cNvPr id="5" name="TextBox 4"/>
+          <p:cNvSpPr txBox="1"/>
+          <p:nvPr/>
+        </p:nvSpPr>
+        <p:spPr>
+          <a:xfrm>
+            <a:off x="1524000" y="200025"/>
+            <a:ext cx="8620125" cy="369332"/>
+          </a:xfrm>
+          <a:prstGeom prst="rect">
+            <a:avLst/>
+          </a:prstGeom>
+          <a:noFill/>
+        </p:spPr>
+        <p:txBody>
+          <a:bodyPr wrap="square" rtlCol="0">
+            <a:spAutoFit/>
+          </a:bodyPr>
+          <a:lstStyle/>
+          <a:p>
+            <a:r>
+              <a:rPr lang="en-US" dirty="0" smtClean="0"/>
+              <a:t>outliers</a:t>
+            </a:r>
+            <a:endParaRPr lang="en-US" dirty="0"/>
+          </a:p>
+        </p:txBody>
+      </p:sp>
+    </p:spTree>
+    <p:extLst>
+      <p:ext uri="{BB962C8B-B14F-4D97-AF65-F5344CB8AC3E}">
+        <p14:creationId xmlns:p14="http://schemas.microsoft.com/office/powerpoint/2010/main" val="548251831"/>
+      </p:ext>
+    </p:extLst>
+  </p:cSld>
+  <p:clrMapOvr>
+    <a:masterClrMapping/>
+  </p:clrMapOvr>
+</p:sld>
+</file>
+
+<file path=ppt/slides/slide24.xml><?xml version="1.0" encoding="utf-8"?>
+<p:sld xmlns:a="http://schemas.openxmlformats.org/drawingml/2006/main" xmlns:r="http://schemas.openxmlformats.org/officeDocument/2006/relationships" xmlns:p="http://schemas.openxmlformats.org/presentationml/2006/main">
+  <p:cSld>
+    <p:spTree>
+      <p:nvGrpSpPr>
+        <p:cNvPr id="1" name=""/>
+        <p:cNvGrpSpPr/>
+        <p:nvPr/>
+      </p:nvGrpSpPr>
+      <p:grpSpPr>
+        <a:xfrm>
+          <a:off x="0" y="0"/>
+          <a:ext cx="0" cy="0"/>
+          <a:chOff x="0" y="0"/>
+          <a:chExt cx="0" cy="0"/>
+        </a:xfrm>
+      </p:grpSpPr>
+      <p:sp>
+        <p:nvSpPr>
+          <p:cNvPr id="2" name="Title 1"/>
+          <p:cNvSpPr>
+            <a:spLocks noGrp="1"/>
+          </p:cNvSpPr>
+          <p:nvPr>
+            <p:ph type="title"/>
+          </p:nvPr>
+        </p:nvSpPr>
+        <p:spPr/>
+        <p:txBody>
+          <a:bodyPr/>
+          <a:lstStyle/>
+          <a:p>
+            <a:r>
+              <a:rPr lang="en-US" dirty="0" smtClean="0"/>
+              <a:t>Graphs before fitting a model</a:t>
+            </a:r>
+            <a:endParaRPr lang="en-US" dirty="0"/>
+          </a:p>
+        </p:txBody>
+      </p:sp>
+      <p:sp>
+        <p:nvSpPr>
+          <p:cNvPr id="3" name="Content Placeholder 2"/>
+          <p:cNvSpPr>
+            <a:spLocks noGrp="1"/>
+          </p:cNvSpPr>
+          <p:nvPr>
+            <p:ph idx="1"/>
+          </p:nvPr>
+        </p:nvSpPr>
+        <p:spPr/>
+        <p:txBody>
+          <a:bodyPr>
+            <a:normAutofit/>
+          </a:bodyPr>
+          <a:lstStyle/>
+          <a:p>
+            <a:r>
+              <a:rPr lang="en-US" dirty="0" smtClean="0"/>
+              <a:t>1-D graphs</a:t>
+            </a:r>
+          </a:p>
+          <a:p>
+            <a:pPr lvl="1"/>
+            <a:r>
+              <a:rPr lang="en-US" dirty="0"/>
+              <a:t>Histogram</a:t>
+            </a:r>
+          </a:p>
+          <a:p>
+            <a:pPr lvl="1"/>
+            <a:r>
+              <a:rPr lang="en-US" dirty="0"/>
+              <a:t>Stem and Leaf Display</a:t>
+            </a:r>
+          </a:p>
+          <a:p>
+            <a:pPr lvl="1"/>
+            <a:r>
+              <a:rPr lang="en-US" dirty="0" err="1"/>
+              <a:t>Dotplot</a:t>
+            </a:r>
+            <a:endParaRPr lang="en-US" dirty="0"/>
+          </a:p>
+          <a:p>
+            <a:pPr lvl="1"/>
+            <a:r>
+              <a:rPr lang="en-US" dirty="0" smtClean="0"/>
+              <a:t>Boxplot</a:t>
+            </a:r>
+          </a:p>
+          <a:p>
+            <a:r>
+              <a:rPr lang="en-US" dirty="0" smtClean="0"/>
+              <a:t>2-D graphs</a:t>
+            </a:r>
+          </a:p>
+          <a:p>
+            <a:pPr lvl="1"/>
+            <a:r>
+              <a:rPr lang="en-US" dirty="0" smtClean="0"/>
+              <a:t>Draftsman’s plot or plot matrix</a:t>
+            </a:r>
+          </a:p>
+          <a:p>
+            <a:pPr lvl="1"/>
+            <a:endParaRPr lang="en-US" dirty="0" smtClean="0"/>
+          </a:p>
+        </p:txBody>
+      </p:sp>
+    </p:spTree>
+    <p:extLst>
+      <p:ext uri="{BB962C8B-B14F-4D97-AF65-F5344CB8AC3E}">
+        <p14:creationId xmlns:p14="http://schemas.microsoft.com/office/powerpoint/2010/main" val="1209688517"/>
+      </p:ext>
+    </p:extLst>
+  </p:cSld>
+  <p:clrMapOvr>
+    <a:masterClrMapping/>
+  </p:clrMapOvr>
+</p:sld>
+</file>
+
+<file path=ppt/slides/slide25.xml><?xml version="1.0" encoding="utf-8"?>
+<p:sld xmlns:a="http://schemas.openxmlformats.org/drawingml/2006/main" xmlns:r="http://schemas.openxmlformats.org/officeDocument/2006/relationships" xmlns:p="http://schemas.openxmlformats.org/presentationml/2006/main">
+  <p:cSld>
+    <p:spTree>
+      <p:nvGrpSpPr>
+        <p:cNvPr id="1" name=""/>
+        <p:cNvGrpSpPr/>
+        <p:nvPr/>
+      </p:nvGrpSpPr>
+      <p:grpSpPr>
+        <a:xfrm>
+          <a:off x="0" y="0"/>
+          <a:ext cx="0" cy="0"/>
+          <a:chOff x="0" y="0"/>
+          <a:chExt cx="0" cy="0"/>
+        </a:xfrm>
+      </p:grpSpPr>
+      <p:sp>
+        <p:nvSpPr>
+          <p:cNvPr id="2" name="Title 1"/>
+          <p:cNvSpPr>
+            <a:spLocks noGrp="1"/>
+          </p:cNvSpPr>
+          <p:nvPr>
+            <p:ph type="title"/>
+          </p:nvPr>
+        </p:nvSpPr>
+        <p:spPr/>
+        <p:txBody>
+          <a:bodyPr/>
+          <a:lstStyle/>
+          <a:p>
+            <a:r>
+              <a:rPr lang="en-US" dirty="0" smtClean="0"/>
+              <a:t>Graphs after fitting a model</a:t>
+            </a:r>
+            <a:endParaRPr lang="en-US" dirty="0"/>
+          </a:p>
+        </p:txBody>
+      </p:sp>
+      <p:sp>
+        <p:nvSpPr>
+          <p:cNvPr id="3" name="Content Placeholder 2"/>
+          <p:cNvSpPr>
+            <a:spLocks noGrp="1"/>
+          </p:cNvSpPr>
+          <p:nvPr>
+            <p:ph idx="1"/>
+          </p:nvPr>
+        </p:nvSpPr>
+        <p:spPr/>
+        <p:txBody>
+          <a:bodyPr>
+            <a:normAutofit fontScale="92500" lnSpcReduction="20000"/>
+          </a:bodyPr>
+          <a:lstStyle/>
+          <a:p>
+            <a:r>
+              <a:rPr lang="en-US" dirty="0" smtClean="0"/>
+              <a:t>Linearity and Normality assumptions</a:t>
+            </a:r>
+          </a:p>
+          <a:p>
+            <a:pPr lvl="1"/>
+            <a:r>
+              <a:rPr lang="en-US" dirty="0" smtClean="0"/>
+              <a:t>Normal Probability plot of the standardized residuals</a:t>
+            </a:r>
+          </a:p>
+          <a:p>
+            <a:pPr lvl="1"/>
+            <a:r>
+              <a:rPr lang="en-US" dirty="0" smtClean="0"/>
+              <a:t>Scatter plot of standardized residuals against each of the predictor variables</a:t>
+            </a:r>
+          </a:p>
+          <a:p>
+            <a:pPr lvl="1"/>
+            <a:r>
+              <a:rPr lang="en-US" dirty="0" smtClean="0"/>
+              <a:t>Scatter Plot of the standardized residual versus the fitted values</a:t>
+            </a:r>
+          </a:p>
+          <a:p>
+            <a:pPr lvl="1"/>
+            <a:r>
+              <a:rPr lang="en-US" dirty="0" smtClean="0"/>
+              <a:t>Index Plot of the standardized residuals</a:t>
+            </a:r>
+          </a:p>
+          <a:p>
+            <a:r>
+              <a:rPr lang="en-US" dirty="0" smtClean="0"/>
+              <a:t>Outlier and Influential observations</a:t>
+            </a:r>
+          </a:p>
+          <a:p>
+            <a:pPr lvl="1"/>
+            <a:r>
+              <a:rPr lang="en-US" dirty="0" smtClean="0"/>
+              <a:t>Cook’s distance</a:t>
+            </a:r>
+          </a:p>
+          <a:p>
+            <a:pPr lvl="1"/>
+            <a:r>
+              <a:rPr lang="en-US" dirty="0" err="1" smtClean="0"/>
+              <a:t>Welsch</a:t>
+            </a:r>
+            <a:r>
+              <a:rPr lang="en-US" dirty="0" smtClean="0"/>
+              <a:t> and </a:t>
+            </a:r>
+            <a:r>
+              <a:rPr lang="en-US" dirty="0" err="1" smtClean="0"/>
+              <a:t>Kuh</a:t>
+            </a:r>
+            <a:r>
+              <a:rPr lang="en-US" dirty="0" smtClean="0"/>
+              <a:t> Measure</a:t>
+            </a:r>
+          </a:p>
+          <a:p>
+            <a:pPr lvl="1"/>
+            <a:r>
+              <a:rPr lang="en-US" dirty="0" err="1" smtClean="0"/>
+              <a:t>Hadi’s</a:t>
+            </a:r>
+            <a:r>
+              <a:rPr lang="en-US" dirty="0" smtClean="0"/>
+              <a:t> Influence Measure</a:t>
+            </a:r>
+          </a:p>
+          <a:p>
+            <a:pPr lvl="1"/>
+            <a:r>
+              <a:rPr lang="en-US" dirty="0" smtClean="0"/>
+              <a:t>Potential residual plot(related to leverage-residual plot)</a:t>
+            </a:r>
+          </a:p>
+          <a:p>
+            <a:r>
+              <a:rPr lang="en-US" dirty="0" smtClean="0"/>
+              <a:t>Diagnostic plots for the effect of variables</a:t>
+            </a:r>
+          </a:p>
+          <a:p>
+            <a:pPr lvl="1"/>
+            <a:r>
+              <a:rPr lang="en-US" dirty="0" smtClean="0"/>
+              <a:t>Added variable plot</a:t>
+            </a:r>
+          </a:p>
+          <a:p>
+            <a:pPr lvl="1"/>
+            <a:r>
+              <a:rPr lang="en-US" dirty="0" smtClean="0"/>
+              <a:t>Residual plus component plot</a:t>
+            </a:r>
+          </a:p>
+          <a:p>
+            <a:pPr lvl="1"/>
+            <a:endParaRPr lang="en-US" dirty="0" smtClean="0"/>
+          </a:p>
+        </p:txBody>
+      </p:sp>
+    </p:spTree>
+    <p:extLst>
+      <p:ext uri="{BB962C8B-B14F-4D97-AF65-F5344CB8AC3E}">
+        <p14:creationId xmlns:p14="http://schemas.microsoft.com/office/powerpoint/2010/main" val="1763581163"/>
+      </p:ext>
+    </p:extLst>
+  </p:cSld>
+  <p:clrMapOvr>
+    <a:masterClrMapping/>
+  </p:clrMapOvr>
+</p:sld>
+</file>
+
+<file path=ppt/slides/slide26.xml><?xml version="1.0" encoding="utf-8"?>
+<p:sld xmlns:a="http://schemas.openxmlformats.org/drawingml/2006/main" xmlns:r="http://schemas.openxmlformats.org/officeDocument/2006/relationships" xmlns:p="http://schemas.openxmlformats.org/presentationml/2006/main">
+  <p:cSld>
+    <p:spTree>
+      <p:nvGrpSpPr>
+        <p:cNvPr id="1" name=""/>
+        <p:cNvGrpSpPr/>
+        <p:nvPr/>
+      </p:nvGrpSpPr>
+      <p:grpSpPr>
+        <a:xfrm>
+          <a:off x="0" y="0"/>
+          <a:ext cx="0" cy="0"/>
+          <a:chOff x="0" y="0"/>
+          <a:chExt cx="0" cy="0"/>
+        </a:xfrm>
+      </p:grpSpPr>
+      <p:sp>
+        <p:nvSpPr>
+          <p:cNvPr id="2" name="Title 1"/>
+          <p:cNvSpPr>
+            <a:spLocks noGrp="1"/>
+          </p:cNvSpPr>
+          <p:nvPr>
+            <p:ph type="title"/>
+          </p:nvPr>
+        </p:nvSpPr>
+        <p:spPr/>
+        <p:txBody>
+          <a:bodyPr/>
+          <a:lstStyle/>
+          <a:p>
+            <a:r>
+              <a:rPr lang="en-US" dirty="0" smtClean="0"/>
+              <a:t>Qualitative variables as predictors</a:t>
+            </a:r>
+            <a:endParaRPr lang="en-US" dirty="0"/>
+          </a:p>
+        </p:txBody>
+      </p:sp>
+      <p:sp>
+        <p:nvSpPr>
+          <p:cNvPr id="3" name="Content Placeholder 2"/>
+          <p:cNvSpPr>
+            <a:spLocks noGrp="1"/>
+          </p:cNvSpPr>
+          <p:nvPr>
+            <p:ph idx="1"/>
+          </p:nvPr>
+        </p:nvSpPr>
+        <p:spPr/>
+        <p:txBody>
+          <a:bodyPr/>
+          <a:lstStyle/>
+          <a:p>
+            <a:endParaRPr lang="en-US"/>
+          </a:p>
+        </p:txBody>
+      </p:sp>
+    </p:spTree>
+    <p:extLst>
+      <p:ext uri="{BB962C8B-B14F-4D97-AF65-F5344CB8AC3E}">
+        <p14:creationId xmlns:p14="http://schemas.microsoft.com/office/powerpoint/2010/main" val="318661224"/>
+      </p:ext>
+    </p:extLst>
+  </p:cSld>
+  <p:clrMapOvr>
+    <a:masterClrMapping/>
+  </p:clrMapOvr>
+</p:sld>
+</file>
+
+<file path=ppt/slides/slide27.xml><?xml version="1.0" encoding="utf-8"?>
+<p:sld xmlns:a="http://schemas.openxmlformats.org/drawingml/2006/main" xmlns:r="http://schemas.openxmlformats.org/officeDocument/2006/relationships" xmlns:p="http://schemas.openxmlformats.org/presentationml/2006/main">
+  <p:cSld>
+    <p:spTree>
+      <p:nvGrpSpPr>
+        <p:cNvPr id="1" name=""/>
+        <p:cNvGrpSpPr/>
+        <p:nvPr/>
+      </p:nvGrpSpPr>
+      <p:grpSpPr>
+        <a:xfrm>
+          <a:off x="0" y="0"/>
+          <a:ext cx="0" cy="0"/>
+          <a:chOff x="0" y="0"/>
+          <a:chExt cx="0" cy="0"/>
+        </a:xfrm>
+      </p:grpSpPr>
+      <p:sp>
+        <p:nvSpPr>
+          <p:cNvPr id="2" name="Title 1"/>
+          <p:cNvSpPr>
+            <a:spLocks noGrp="1"/>
+          </p:cNvSpPr>
+          <p:nvPr>
+            <p:ph type="title"/>
+          </p:nvPr>
+        </p:nvSpPr>
+        <p:spPr/>
+        <p:txBody>
+          <a:bodyPr/>
+          <a:lstStyle/>
+          <a:p>
+            <a:r>
+              <a:rPr lang="en-US" dirty="0" smtClean="0"/>
+              <a:t>Variables Transformation</a:t>
+            </a:r>
+            <a:endParaRPr lang="en-US" dirty="0"/>
+          </a:p>
+        </p:txBody>
+      </p:sp>
+      <p:sp>
+        <p:nvSpPr>
+          <p:cNvPr id="3" name="Content Placeholder 2"/>
+          <p:cNvSpPr>
+            <a:spLocks noGrp="1"/>
+          </p:cNvSpPr>
+          <p:nvPr>
+            <p:ph idx="1"/>
+          </p:nvPr>
+        </p:nvSpPr>
+        <p:spPr/>
+        <p:txBody>
+          <a:bodyPr/>
+          <a:lstStyle/>
+          <a:p>
+            <a:endParaRPr lang="en-US" dirty="0"/>
+          </a:p>
+        </p:txBody>
+      </p:sp>
+    </p:spTree>
+    <p:extLst>
+      <p:ext uri="{BB962C8B-B14F-4D97-AF65-F5344CB8AC3E}">
+        <p14:creationId xmlns:p14="http://schemas.microsoft.com/office/powerpoint/2010/main" val="1901655816"/>
+      </p:ext>
+    </p:extLst>
+  </p:cSld>
+  <p:clrMapOvr>
+    <a:masterClrMapping/>
+  </p:clrMapOvr>
+</p:sld>
+</file>
+
+<file path=ppt/slides/slide28.xml><?xml version="1.0" encoding="utf-8"?>
+<p:sld xmlns:a="http://schemas.openxmlformats.org/drawingml/2006/main" xmlns:r="http://schemas.openxmlformats.org/officeDocument/2006/relationships" xmlns:p="http://schemas.openxmlformats.org/presentationml/2006/main">
+  <p:cSld>
+    <p:spTree>
+      <p:nvGrpSpPr>
+        <p:cNvPr id="1" name=""/>
+        <p:cNvGrpSpPr/>
+        <p:nvPr/>
+      </p:nvGrpSpPr>
+      <p:grpSpPr>
+        <a:xfrm>
+          <a:off x="0" y="0"/>
+          <a:ext cx="0" cy="0"/>
+          <a:chOff x="0" y="0"/>
+          <a:chExt cx="0" cy="0"/>
+        </a:xfrm>
+      </p:grpSpPr>
+      <p:sp>
+        <p:nvSpPr>
+          <p:cNvPr id="2" name="Title 1"/>
+          <p:cNvSpPr>
+            <a:spLocks noGrp="1"/>
+          </p:cNvSpPr>
+          <p:nvPr>
+            <p:ph type="title"/>
+          </p:nvPr>
+        </p:nvSpPr>
+        <p:spPr/>
+        <p:txBody>
+          <a:bodyPr/>
+          <a:lstStyle/>
+          <a:p>
+            <a:r>
+              <a:rPr lang="en-US" dirty="0" smtClean="0"/>
+              <a:t>Autocorrelation</a:t>
+            </a:r>
+            <a:endParaRPr lang="en-US" dirty="0"/>
+          </a:p>
+        </p:txBody>
+      </p:sp>
+      <p:sp>
+        <p:nvSpPr>
+          <p:cNvPr id="3" name="Content Placeholder 2"/>
+          <p:cNvSpPr>
+            <a:spLocks noGrp="1"/>
+          </p:cNvSpPr>
+          <p:nvPr>
+            <p:ph idx="1"/>
+          </p:nvPr>
+        </p:nvSpPr>
+        <p:spPr/>
+        <p:txBody>
+          <a:bodyPr/>
+          <a:lstStyle/>
+          <a:p>
+            <a:r>
+              <a:rPr lang="en-US" dirty="0" smtClean="0"/>
+              <a:t>Durbin Watson Statistic</a:t>
+            </a:r>
+            <a:endParaRPr lang="en-US" dirty="0"/>
+          </a:p>
+        </p:txBody>
+      </p:sp>
+    </p:spTree>
+    <p:extLst>
+      <p:ext uri="{BB962C8B-B14F-4D97-AF65-F5344CB8AC3E}">
+        <p14:creationId xmlns:p14="http://schemas.microsoft.com/office/powerpoint/2010/main" val="284169078"/>
+      </p:ext>
+    </p:extLst>
+  </p:cSld>
+  <p:clrMapOvr>
+    <a:masterClrMapping/>
+  </p:clrMapOvr>
+</p:sld>
+</file>
+
+<file path=ppt/slides/slide29.xml><?xml version="1.0" encoding="utf-8"?>
+<p:sld xmlns:a="http://schemas.openxmlformats.org/drawingml/2006/main" xmlns:r="http://schemas.openxmlformats.org/officeDocument/2006/relationships" xmlns:p="http://schemas.openxmlformats.org/presentationml/2006/main">
+  <p:cSld>
+    <p:spTree>
+      <p:nvGrpSpPr>
+        <p:cNvPr id="1" name=""/>
+        <p:cNvGrpSpPr/>
+        <p:nvPr/>
+      </p:nvGrpSpPr>
+      <p:grpSpPr>
+        <a:xfrm>
+          <a:off x="0" y="0"/>
+          <a:ext cx="0" cy="0"/>
+          <a:chOff x="0" y="0"/>
+          <a:chExt cx="0" cy="0"/>
+        </a:xfrm>
+      </p:grpSpPr>
+      <p:pic>
+        <p:nvPicPr>
+          <p:cNvPr id="4" name="Picture 3"/>
+          <p:cNvPicPr>
+            <a:picLocks noChangeAspect="1"/>
+          </p:cNvPicPr>
+          <p:nvPr/>
+        </p:nvPicPr>
+        <p:blipFill>
+          <a:blip r:embed="rId2"/>
+          <a:stretch>
+            <a:fillRect/>
+          </a:stretch>
+        </p:blipFill>
+        <p:spPr>
+          <a:xfrm>
+            <a:off x="1524000" y="871538"/>
+            <a:ext cx="9144000" cy="5986462"/>
+          </a:xfrm>
+          <a:prstGeom prst="rect">
+            <a:avLst/>
+          </a:prstGeom>
+        </p:spPr>
+      </p:pic>
+      <p:sp>
+        <p:nvSpPr>
+          <p:cNvPr id="5" name="TextBox 4"/>
+          <p:cNvSpPr txBox="1"/>
+          <p:nvPr/>
+        </p:nvSpPr>
+        <p:spPr>
+          <a:xfrm>
+            <a:off x="2243138" y="357188"/>
+            <a:ext cx="5643562" cy="369332"/>
+          </a:xfrm>
+          <a:prstGeom prst="rect">
+            <a:avLst/>
+          </a:prstGeom>
+          <a:noFill/>
+        </p:spPr>
+        <p:txBody>
+          <a:bodyPr wrap="square" rtlCol="0">
+            <a:spAutoFit/>
+          </a:bodyPr>
+          <a:lstStyle/>
+          <a:p>
+            <a:r>
+              <a:rPr lang="en-US" dirty="0" smtClean="0"/>
+              <a:t>Autocorrelation</a:t>
+            </a:r>
+            <a:endParaRPr lang="en-US" dirty="0"/>
+          </a:p>
+        </p:txBody>
+      </p:sp>
+    </p:spTree>
+    <p:extLst>
+      <p:ext uri="{BB962C8B-B14F-4D97-AF65-F5344CB8AC3E}">
+        <p14:creationId xmlns:p14="http://schemas.microsoft.com/office/powerpoint/2010/main" val="1883465293"/>
       </p:ext>
     </p:extLst>
   </p:cSld>
@@ -3260,6 +5561,540 @@
     <p:extLst>
       <p:ext uri="{BB962C8B-B14F-4D97-AF65-F5344CB8AC3E}">
         <p14:creationId xmlns:p14="http://schemas.microsoft.com/office/powerpoint/2010/main" val="828251837"/>
+      </p:ext>
+    </p:extLst>
+  </p:cSld>
+  <p:clrMapOvr>
+    <a:masterClrMapping/>
+  </p:clrMapOvr>
+</p:sld>
+</file>
+
+<file path=ppt/slides/slide30.xml><?xml version="1.0" encoding="utf-8"?>
+<p:sld xmlns:a="http://schemas.openxmlformats.org/drawingml/2006/main" xmlns:r="http://schemas.openxmlformats.org/officeDocument/2006/relationships" xmlns:p="http://schemas.openxmlformats.org/presentationml/2006/main">
+  <p:cSld>
+    <p:spTree>
+      <p:nvGrpSpPr>
+        <p:cNvPr id="1" name=""/>
+        <p:cNvGrpSpPr/>
+        <p:nvPr/>
+      </p:nvGrpSpPr>
+      <p:grpSpPr>
+        <a:xfrm>
+          <a:off x="0" y="0"/>
+          <a:ext cx="0" cy="0"/>
+          <a:chOff x="0" y="0"/>
+          <a:chExt cx="0" cy="0"/>
+        </a:xfrm>
+      </p:grpSpPr>
+      <p:sp>
+        <p:nvSpPr>
+          <p:cNvPr id="2" name="Title 1"/>
+          <p:cNvSpPr>
+            <a:spLocks noGrp="1"/>
+          </p:cNvSpPr>
+          <p:nvPr>
+            <p:ph type="title"/>
+          </p:nvPr>
+        </p:nvSpPr>
+        <p:spPr/>
+        <p:txBody>
+          <a:bodyPr/>
+          <a:lstStyle/>
+          <a:p>
+            <a:r>
+              <a:rPr lang="en-US" dirty="0" smtClean="0"/>
+              <a:t>Multi-collinearity</a:t>
+            </a:r>
+            <a:endParaRPr lang="en-US" dirty="0"/>
+          </a:p>
+        </p:txBody>
+      </p:sp>
+      <p:sp>
+        <p:nvSpPr>
+          <p:cNvPr id="3" name="Content Placeholder 2"/>
+          <p:cNvSpPr>
+            <a:spLocks noGrp="1"/>
+          </p:cNvSpPr>
+          <p:nvPr>
+            <p:ph idx="1"/>
+          </p:nvPr>
+        </p:nvSpPr>
+        <p:spPr/>
+        <p:txBody>
+          <a:bodyPr/>
+          <a:lstStyle/>
+          <a:p>
+            <a:r>
+              <a:rPr lang="en-US" dirty="0" smtClean="0"/>
+              <a:t>Detection </a:t>
+            </a:r>
+          </a:p>
+          <a:p>
+            <a:r>
+              <a:rPr lang="en-US" dirty="0" smtClean="0"/>
+              <a:t>VIF</a:t>
+            </a:r>
+          </a:p>
+          <a:p>
+            <a:r>
+              <a:rPr lang="en-US" dirty="0" smtClean="0"/>
+              <a:t>Principal components regression</a:t>
+            </a:r>
+          </a:p>
+          <a:p>
+            <a:r>
+              <a:rPr lang="en-US" dirty="0" smtClean="0"/>
+              <a:t>Ridge regression</a:t>
+            </a:r>
+          </a:p>
+          <a:p>
+            <a:endParaRPr lang="en-US" dirty="0"/>
+          </a:p>
+        </p:txBody>
+      </p:sp>
+    </p:spTree>
+    <p:extLst>
+      <p:ext uri="{BB962C8B-B14F-4D97-AF65-F5344CB8AC3E}">
+        <p14:creationId xmlns:p14="http://schemas.microsoft.com/office/powerpoint/2010/main" val="237813702"/>
+      </p:ext>
+    </p:extLst>
+  </p:cSld>
+  <p:clrMapOvr>
+    <a:masterClrMapping/>
+  </p:clrMapOvr>
+</p:sld>
+</file>
+
+<file path=ppt/slides/slide31.xml><?xml version="1.0" encoding="utf-8"?>
+<p:sld xmlns:a="http://schemas.openxmlformats.org/drawingml/2006/main" xmlns:r="http://schemas.openxmlformats.org/officeDocument/2006/relationships" xmlns:p="http://schemas.openxmlformats.org/presentationml/2006/main">
+  <p:cSld>
+    <p:spTree>
+      <p:nvGrpSpPr>
+        <p:cNvPr id="1" name=""/>
+        <p:cNvGrpSpPr/>
+        <p:nvPr/>
+      </p:nvGrpSpPr>
+      <p:grpSpPr>
+        <a:xfrm>
+          <a:off x="0" y="0"/>
+          <a:ext cx="0" cy="0"/>
+          <a:chOff x="0" y="0"/>
+          <a:chExt cx="0" cy="0"/>
+        </a:xfrm>
+      </p:grpSpPr>
+      <p:sp>
+        <p:nvSpPr>
+          <p:cNvPr id="2" name="Title 1"/>
+          <p:cNvSpPr>
+            <a:spLocks noGrp="1"/>
+          </p:cNvSpPr>
+          <p:nvPr>
+            <p:ph type="title"/>
+          </p:nvPr>
+        </p:nvSpPr>
+        <p:spPr/>
+        <p:txBody>
+          <a:bodyPr/>
+          <a:lstStyle/>
+          <a:p>
+            <a:r>
+              <a:rPr lang="en-US" dirty="0"/>
+              <a:t>M</a:t>
+            </a:r>
+            <a:r>
+              <a:rPr lang="en-US" dirty="0" smtClean="0"/>
+              <a:t>odel evaluation</a:t>
+            </a:r>
+            <a:endParaRPr lang="en-US" dirty="0"/>
+          </a:p>
+        </p:txBody>
+      </p:sp>
+      <p:sp>
+        <p:nvSpPr>
+          <p:cNvPr id="3" name="Content Placeholder 2"/>
+          <p:cNvSpPr>
+            <a:spLocks noGrp="1"/>
+          </p:cNvSpPr>
+          <p:nvPr>
+            <p:ph idx="1"/>
+          </p:nvPr>
+        </p:nvSpPr>
+        <p:spPr/>
+        <p:txBody>
+          <a:bodyPr/>
+          <a:lstStyle/>
+          <a:p>
+            <a:r>
+              <a:rPr lang="en-US" dirty="0" smtClean="0"/>
+              <a:t>Residual Mean square</a:t>
+            </a:r>
+          </a:p>
+          <a:p>
+            <a:r>
+              <a:rPr lang="en-US" dirty="0" smtClean="0"/>
+              <a:t>Mallows </a:t>
+            </a:r>
+            <a:r>
+              <a:rPr lang="en-US" dirty="0" err="1" smtClean="0"/>
+              <a:t>Cp</a:t>
+            </a:r>
+            <a:endParaRPr lang="en-US" dirty="0" smtClean="0"/>
+          </a:p>
+          <a:p>
+            <a:r>
+              <a:rPr lang="en-US" dirty="0" smtClean="0"/>
+              <a:t>Information Criteria (AIC,BIC)</a:t>
+            </a:r>
+          </a:p>
+          <a:p>
+            <a:endParaRPr lang="en-US" dirty="0"/>
+          </a:p>
+        </p:txBody>
+      </p:sp>
+    </p:spTree>
+    <p:extLst>
+      <p:ext uri="{BB962C8B-B14F-4D97-AF65-F5344CB8AC3E}">
+        <p14:creationId xmlns:p14="http://schemas.microsoft.com/office/powerpoint/2010/main" val="287865469"/>
+      </p:ext>
+    </p:extLst>
+  </p:cSld>
+  <p:clrMapOvr>
+    <a:masterClrMapping/>
+  </p:clrMapOvr>
+</p:sld>
+</file>
+
+<file path=ppt/slides/slide32.xml><?xml version="1.0" encoding="utf-8"?>
+<p:sld xmlns:a="http://schemas.openxmlformats.org/drawingml/2006/main" xmlns:r="http://schemas.openxmlformats.org/officeDocument/2006/relationships" xmlns:p="http://schemas.openxmlformats.org/presentationml/2006/main">
+  <p:cSld>
+    <p:spTree>
+      <p:nvGrpSpPr>
+        <p:cNvPr id="1" name=""/>
+        <p:cNvGrpSpPr/>
+        <p:nvPr/>
+      </p:nvGrpSpPr>
+      <p:grpSpPr>
+        <a:xfrm>
+          <a:off x="0" y="0"/>
+          <a:ext cx="0" cy="0"/>
+          <a:chOff x="0" y="0"/>
+          <a:chExt cx="0" cy="0"/>
+        </a:xfrm>
+      </p:grpSpPr>
+      <p:sp>
+        <p:nvSpPr>
+          <p:cNvPr id="2" name="Title 1"/>
+          <p:cNvSpPr>
+            <a:spLocks noGrp="1"/>
+          </p:cNvSpPr>
+          <p:nvPr>
+            <p:ph type="title"/>
+          </p:nvPr>
+        </p:nvSpPr>
+        <p:spPr/>
+        <p:txBody>
+          <a:bodyPr/>
+          <a:lstStyle/>
+          <a:p>
+            <a:r>
+              <a:rPr lang="en-US" dirty="0" smtClean="0"/>
+              <a:t>Variable Selection procedures</a:t>
+            </a:r>
+            <a:endParaRPr lang="en-US" dirty="0"/>
+          </a:p>
+        </p:txBody>
+      </p:sp>
+      <p:sp>
+        <p:nvSpPr>
+          <p:cNvPr id="3" name="Content Placeholder 2"/>
+          <p:cNvSpPr>
+            <a:spLocks noGrp="1"/>
+          </p:cNvSpPr>
+          <p:nvPr>
+            <p:ph idx="1"/>
+          </p:nvPr>
+        </p:nvSpPr>
+        <p:spPr/>
+        <p:txBody>
+          <a:bodyPr/>
+          <a:lstStyle/>
+          <a:p>
+            <a:r>
+              <a:rPr lang="en-US" dirty="0" smtClean="0"/>
+              <a:t>Forward selection Procedure</a:t>
+            </a:r>
+          </a:p>
+          <a:p>
+            <a:r>
+              <a:rPr lang="en-US" dirty="0" smtClean="0"/>
+              <a:t>Backward Elimination Procedure</a:t>
+            </a:r>
+          </a:p>
+          <a:p>
+            <a:r>
+              <a:rPr lang="en-US" dirty="0" smtClean="0"/>
+              <a:t>Stepwise method</a:t>
+            </a:r>
+          </a:p>
+          <a:p>
+            <a:r>
+              <a:rPr lang="en-US" dirty="0"/>
+              <a:t>Stepwise regression presents you with a single model constructed using the p-values of the predictor variables</a:t>
+            </a:r>
+          </a:p>
+          <a:p>
+            <a:r>
+              <a:rPr lang="en-US" dirty="0"/>
+              <a:t>Best subsets regression assess all possible models and displays a subset along with their adjusted R-squared and Mallows' </a:t>
+            </a:r>
+            <a:r>
+              <a:rPr lang="en-US" dirty="0" err="1"/>
+              <a:t>Cp</a:t>
+            </a:r>
+            <a:r>
+              <a:rPr lang="en-US" dirty="0"/>
+              <a:t> </a:t>
+            </a:r>
+            <a:r>
+              <a:rPr lang="en-US" dirty="0" smtClean="0"/>
+              <a:t>values</a:t>
+            </a:r>
+            <a:endParaRPr lang="en-US" dirty="0"/>
+          </a:p>
+        </p:txBody>
+      </p:sp>
+    </p:spTree>
+    <p:extLst>
+      <p:ext uri="{BB962C8B-B14F-4D97-AF65-F5344CB8AC3E}">
+        <p14:creationId xmlns:p14="http://schemas.microsoft.com/office/powerpoint/2010/main" val="2087816205"/>
+      </p:ext>
+    </p:extLst>
+  </p:cSld>
+  <p:clrMapOvr>
+    <a:masterClrMapping/>
+  </p:clrMapOvr>
+</p:sld>
+</file>
+
+<file path=ppt/slides/slide33.xml><?xml version="1.0" encoding="utf-8"?>
+<p:sld xmlns:a="http://schemas.openxmlformats.org/drawingml/2006/main" xmlns:r="http://schemas.openxmlformats.org/officeDocument/2006/relationships" xmlns:p="http://schemas.openxmlformats.org/presentationml/2006/main">
+  <p:cSld>
+    <p:spTree>
+      <p:nvGrpSpPr>
+        <p:cNvPr id="1" name=""/>
+        <p:cNvGrpSpPr/>
+        <p:nvPr/>
+      </p:nvGrpSpPr>
+      <p:grpSpPr>
+        <a:xfrm>
+          <a:off x="0" y="0"/>
+          <a:ext cx="0" cy="0"/>
+          <a:chOff x="0" y="0"/>
+          <a:chExt cx="0" cy="0"/>
+        </a:xfrm>
+      </p:grpSpPr>
+      <p:sp>
+        <p:nvSpPr>
+          <p:cNvPr id="2" name="Title 1"/>
+          <p:cNvSpPr>
+            <a:spLocks noGrp="1"/>
+          </p:cNvSpPr>
+          <p:nvPr>
+            <p:ph type="title"/>
+          </p:nvPr>
+        </p:nvSpPr>
+        <p:spPr/>
+        <p:txBody>
+          <a:bodyPr/>
+          <a:lstStyle/>
+          <a:p>
+            <a:r>
+              <a:rPr lang="en-US" dirty="0" smtClean="0"/>
+              <a:t>Sampling procedures for model validation</a:t>
+            </a:r>
+            <a:endParaRPr lang="en-US" dirty="0"/>
+          </a:p>
+        </p:txBody>
+      </p:sp>
+      <p:sp>
+        <p:nvSpPr>
+          <p:cNvPr id="3" name="Content Placeholder 2"/>
+          <p:cNvSpPr>
+            <a:spLocks noGrp="1"/>
+          </p:cNvSpPr>
+          <p:nvPr>
+            <p:ph idx="1"/>
+          </p:nvPr>
+        </p:nvSpPr>
+        <p:spPr/>
+        <p:txBody>
+          <a:bodyPr/>
+          <a:lstStyle/>
+          <a:p>
+            <a:r>
+              <a:rPr lang="en-US" dirty="0" smtClean="0"/>
+              <a:t>Bootstrap</a:t>
+            </a:r>
+          </a:p>
+          <a:p>
+            <a:r>
+              <a:rPr lang="en-US" dirty="0" err="1" smtClean="0"/>
+              <a:t>Jacknife</a:t>
+            </a:r>
+            <a:endParaRPr lang="en-US" dirty="0" smtClean="0"/>
+          </a:p>
+          <a:p>
+            <a:r>
+              <a:rPr lang="en-US" dirty="0" smtClean="0"/>
+              <a:t>Cross validation</a:t>
+            </a:r>
+          </a:p>
+          <a:p>
+            <a:endParaRPr lang="en-US" dirty="0"/>
+          </a:p>
+        </p:txBody>
+      </p:sp>
+    </p:spTree>
+    <p:extLst>
+      <p:ext uri="{BB962C8B-B14F-4D97-AF65-F5344CB8AC3E}">
+        <p14:creationId xmlns:p14="http://schemas.microsoft.com/office/powerpoint/2010/main" val="64566665"/>
+      </p:ext>
+    </p:extLst>
+  </p:cSld>
+  <p:clrMapOvr>
+    <a:masterClrMapping/>
+  </p:clrMapOvr>
+</p:sld>
+</file>
+
+<file path=ppt/slides/slide34.xml><?xml version="1.0" encoding="utf-8"?>
+<p:sld xmlns:a="http://schemas.openxmlformats.org/drawingml/2006/main" xmlns:r="http://schemas.openxmlformats.org/officeDocument/2006/relationships" xmlns:p="http://schemas.openxmlformats.org/presentationml/2006/main">
+  <p:cSld>
+    <p:spTree>
+      <p:nvGrpSpPr>
+        <p:cNvPr id="1" name=""/>
+        <p:cNvGrpSpPr/>
+        <p:nvPr/>
+      </p:nvGrpSpPr>
+      <p:grpSpPr>
+        <a:xfrm>
+          <a:off x="0" y="0"/>
+          <a:ext cx="0" cy="0"/>
+          <a:chOff x="0" y="0"/>
+          <a:chExt cx="0" cy="0"/>
+        </a:xfrm>
+      </p:grpSpPr>
+      <p:sp>
+        <p:nvSpPr>
+          <p:cNvPr id="2" name="Title 1"/>
+          <p:cNvSpPr>
+            <a:spLocks noGrp="1"/>
+          </p:cNvSpPr>
+          <p:nvPr>
+            <p:ph type="title"/>
+          </p:nvPr>
+        </p:nvSpPr>
+        <p:spPr/>
+        <p:txBody>
+          <a:bodyPr/>
+          <a:lstStyle/>
+          <a:p>
+            <a:r>
+              <a:rPr lang="en-US" dirty="0" smtClean="0"/>
+              <a:t>Summarize fitting regression models</a:t>
+            </a:r>
+            <a:endParaRPr lang="en-US" dirty="0"/>
+          </a:p>
+        </p:txBody>
+      </p:sp>
+      <p:sp>
+        <p:nvSpPr>
+          <p:cNvPr id="3" name="Content Placeholder 2"/>
+          <p:cNvSpPr>
+            <a:spLocks noGrp="1"/>
+          </p:cNvSpPr>
+          <p:nvPr>
+            <p:ph idx="1"/>
+          </p:nvPr>
+        </p:nvSpPr>
+        <p:spPr/>
+        <p:txBody>
+          <a:bodyPr>
+            <a:normAutofit lnSpcReduction="10000"/>
+          </a:bodyPr>
+          <a:lstStyle/>
+          <a:p>
+            <a:r>
+              <a:rPr lang="en-US" dirty="0" smtClean="0"/>
+              <a:t>Examine variables and variable transformations</a:t>
+            </a:r>
+          </a:p>
+          <a:p>
+            <a:r>
+              <a:rPr lang="en-US" dirty="0" smtClean="0"/>
+              <a:t>Scatter plots to examine correlation/collinearity</a:t>
+            </a:r>
+          </a:p>
+          <a:p>
+            <a:r>
+              <a:rPr lang="en-US" dirty="0" smtClean="0"/>
+              <a:t>Fit the full regression model</a:t>
+            </a:r>
+          </a:p>
+          <a:p>
+            <a:pPr lvl="1"/>
+            <a:r>
+              <a:rPr lang="en-US" dirty="0" smtClean="0"/>
+              <a:t>Linearity assumptions</a:t>
+            </a:r>
+          </a:p>
+          <a:p>
+            <a:pPr lvl="1"/>
+            <a:r>
+              <a:rPr lang="en-US" dirty="0" smtClean="0"/>
+              <a:t>Heteroscedasticity/Autocorrelation(particularly for time series data)</a:t>
+            </a:r>
+          </a:p>
+          <a:p>
+            <a:pPr lvl="1"/>
+            <a:r>
+              <a:rPr lang="en-US" dirty="0" smtClean="0"/>
+              <a:t>Outliers/high leverage points/influential points</a:t>
+            </a:r>
+          </a:p>
+          <a:p>
+            <a:r>
+              <a:rPr lang="en-US" dirty="0" smtClean="0"/>
+              <a:t>Examine added variable plots, AIC/BIC criteria if new variables are added</a:t>
+            </a:r>
+          </a:p>
+          <a:p>
+            <a:r>
+              <a:rPr lang="en-US" dirty="0" smtClean="0"/>
+              <a:t>Check VIF/residual plots and repeat above step</a:t>
+            </a:r>
+          </a:p>
+          <a:p>
+            <a:r>
+              <a:rPr lang="en-US" dirty="0" smtClean="0"/>
+              <a:t>Validate model fit by resampling(</a:t>
+            </a:r>
+            <a:r>
+              <a:rPr lang="en-US" dirty="0" err="1" smtClean="0"/>
+              <a:t>bootstrap,jacknife,cross</a:t>
+            </a:r>
+            <a:r>
+              <a:rPr lang="en-US" dirty="0" smtClean="0"/>
+              <a:t> validation)</a:t>
+            </a:r>
+          </a:p>
+        </p:txBody>
+      </p:sp>
+    </p:spTree>
+    <p:extLst>
+      <p:ext uri="{BB962C8B-B14F-4D97-AF65-F5344CB8AC3E}">
+        <p14:creationId xmlns:p14="http://schemas.microsoft.com/office/powerpoint/2010/main" val="561630945"/>
       </p:ext>
     </p:extLst>
   </p:cSld>
@@ -3444,13 +6279,8 @@
           <a:p>
             <a:r>
               <a:rPr lang="en-US" dirty="0" smtClean="0"/>
-              <a:t>Covariance and Correlation </a:t>
-            </a:r>
-            <a:r>
-              <a:rPr lang="en-US" dirty="0" smtClean="0"/>
-              <a:t>Coefficient</a:t>
-            </a:r>
-            <a:endParaRPr lang="en-US" dirty="0" smtClean="0"/>
+              <a:t>Covariance and Correlation Coefficient</a:t>
+            </a:r>
           </a:p>
           <a:p>
             <a:r>
@@ -3571,6 +6401,60 @@
           <a:chExt cx="0" cy="0"/>
         </a:xfrm>
       </p:grpSpPr>
+      <p:pic>
+        <p:nvPicPr>
+          <p:cNvPr id="4" name="Picture 3"/>
+          <p:cNvPicPr>
+            <a:picLocks noChangeAspect="1"/>
+          </p:cNvPicPr>
+          <p:nvPr/>
+        </p:nvPicPr>
+        <p:blipFill>
+          <a:blip r:embed="rId2"/>
+          <a:stretch>
+            <a:fillRect/>
+          </a:stretch>
+        </p:blipFill>
+        <p:spPr>
+          <a:xfrm>
+            <a:off x="1524000" y="0"/>
+            <a:ext cx="9144000" cy="6858000"/>
+          </a:xfrm>
+          <a:prstGeom prst="rect">
+            <a:avLst/>
+          </a:prstGeom>
+        </p:spPr>
+      </p:pic>
+    </p:spTree>
+    <p:extLst>
+      <p:ext uri="{BB962C8B-B14F-4D97-AF65-F5344CB8AC3E}">
+        <p14:creationId xmlns:p14="http://schemas.microsoft.com/office/powerpoint/2010/main" val="6972250"/>
+      </p:ext>
+    </p:extLst>
+  </p:cSld>
+  <p:clrMapOvr>
+    <a:masterClrMapping/>
+  </p:clrMapOvr>
+</p:sld>
+</file>
+
+<file path=ppt/slides/slide8.xml><?xml version="1.0" encoding="utf-8"?>
+<p:sld xmlns:a="http://schemas.openxmlformats.org/drawingml/2006/main" xmlns:r="http://schemas.openxmlformats.org/officeDocument/2006/relationships" xmlns:p="http://schemas.openxmlformats.org/presentationml/2006/main">
+  <p:cSld>
+    <p:spTree>
+      <p:nvGrpSpPr>
+        <p:cNvPr id="1" name=""/>
+        <p:cNvGrpSpPr/>
+        <p:nvPr/>
+      </p:nvGrpSpPr>
+      <p:grpSpPr>
+        <a:xfrm>
+          <a:off x="0" y="0"/>
+          <a:ext cx="0" cy="0"/>
+          <a:chOff x="0" y="0"/>
+          <a:chExt cx="0" cy="0"/>
+        </a:xfrm>
+      </p:grpSpPr>
       <p:sp>
         <p:nvSpPr>
           <p:cNvPr id="2" name="Title 1"/>
@@ -3610,13 +6494,11 @@
           <a:lstStyle/>
           <a:p>
             <a:r>
-              <a:rPr lang="en-US" dirty="0" err="1" smtClean="0"/>
-              <a:t>Anscombe</a:t>
-            </a:r>
-            <a:r>
-              <a:rPr lang="en-US" dirty="0" smtClean="0"/>
-              <a:t> Quartet</a:t>
-            </a:r>
+              <a:rPr lang="en-US" dirty="0" smtClean="0"/>
+              <a:t>Parameter Estimation with Least squares method</a:t>
+            </a:r>
+          </a:p>
+          <a:p>
             <a:endParaRPr lang="en-US" dirty="0"/>
           </a:p>
         </p:txBody>
@@ -3625,6 +6507,84 @@
     <p:extLst>
       <p:ext uri="{BB962C8B-B14F-4D97-AF65-F5344CB8AC3E}">
         <p14:creationId xmlns:p14="http://schemas.microsoft.com/office/powerpoint/2010/main" val="1338657751"/>
+      </p:ext>
+    </p:extLst>
+  </p:cSld>
+  <p:clrMapOvr>
+    <a:masterClrMapping/>
+  </p:clrMapOvr>
+</p:sld>
+</file>
+
+<file path=ppt/slides/slide9.xml><?xml version="1.0" encoding="utf-8"?>
+<p:sld xmlns:a="http://schemas.openxmlformats.org/drawingml/2006/main" xmlns:r="http://schemas.openxmlformats.org/officeDocument/2006/relationships" xmlns:p="http://schemas.openxmlformats.org/presentationml/2006/main">
+  <p:cSld>
+    <p:spTree>
+      <p:nvGrpSpPr>
+        <p:cNvPr id="1" name=""/>
+        <p:cNvGrpSpPr/>
+        <p:nvPr/>
+      </p:nvGrpSpPr>
+      <p:grpSpPr>
+        <a:xfrm>
+          <a:off x="0" y="0"/>
+          <a:ext cx="0" cy="0"/>
+          <a:chOff x="0" y="0"/>
+          <a:chExt cx="0" cy="0"/>
+        </a:xfrm>
+      </p:grpSpPr>
+      <p:sp>
+        <p:nvSpPr>
+          <p:cNvPr id="2" name="Title 1"/>
+          <p:cNvSpPr>
+            <a:spLocks noGrp="1"/>
+          </p:cNvSpPr>
+          <p:nvPr>
+            <p:ph type="title"/>
+          </p:nvPr>
+        </p:nvSpPr>
+        <p:spPr/>
+        <p:txBody>
+          <a:bodyPr/>
+          <a:lstStyle/>
+          <a:p>
+            <a:r>
+              <a:rPr lang="en-US" dirty="0" smtClean="0"/>
+              <a:t>Simple Linear Regression</a:t>
+            </a:r>
+            <a:endParaRPr lang="en-US" dirty="0"/>
+          </a:p>
+        </p:txBody>
+      </p:sp>
+      <p:sp>
+        <p:nvSpPr>
+          <p:cNvPr id="3" name="Content Placeholder 2"/>
+          <p:cNvSpPr>
+            <a:spLocks noGrp="1"/>
+          </p:cNvSpPr>
+          <p:nvPr>
+            <p:ph idx="1"/>
+          </p:nvPr>
+        </p:nvSpPr>
+        <p:spPr/>
+        <p:txBody>
+          <a:bodyPr/>
+          <a:lstStyle/>
+          <a:p>
+            <a:r>
+              <a:rPr lang="en-US" dirty="0" smtClean="0"/>
+              <a:t>Tests of Hypotheses</a:t>
+            </a:r>
+          </a:p>
+          <a:p>
+            <a:endParaRPr lang="en-US" dirty="0"/>
+          </a:p>
+        </p:txBody>
+      </p:sp>
+    </p:spTree>
+    <p:extLst>
+      <p:ext uri="{BB962C8B-B14F-4D97-AF65-F5344CB8AC3E}">
+        <p14:creationId xmlns:p14="http://schemas.microsoft.com/office/powerpoint/2010/main" val="623333648"/>
       </p:ext>
     </p:extLst>
   </p:cSld>
@@ -3893,4 +6853,265 @@
     </a:ext>
   </a:extLst>
 </a:theme>
+</file>
+
+<file path=ppt/theme/theme2.xml><?xml version="1.0" encoding="utf-8"?>
+<a:theme xmlns:a="http://schemas.openxmlformats.org/drawingml/2006/main" name="Office Theme">
+  <a:themeElements>
+    <a:clrScheme name="Office">
+      <a:dk1>
+        <a:sysClr val="windowText" lastClr="000000"/>
+      </a:dk1>
+      <a:lt1>
+        <a:sysClr val="window" lastClr="FFFFFF"/>
+      </a:lt1>
+      <a:dk2>
+        <a:srgbClr val="44546A"/>
+      </a:dk2>
+      <a:lt2>
+        <a:srgbClr val="E7E6E6"/>
+      </a:lt2>
+      <a:accent1>
+        <a:srgbClr val="4472C4"/>
+      </a:accent1>
+      <a:accent2>
+        <a:srgbClr val="ED7D31"/>
+      </a:accent2>
+      <a:accent3>
+        <a:srgbClr val="A5A5A5"/>
+      </a:accent3>
+      <a:accent4>
+        <a:srgbClr val="FFC000"/>
+      </a:accent4>
+      <a:accent5>
+        <a:srgbClr val="5B9BD5"/>
+      </a:accent5>
+      <a:accent6>
+        <a:srgbClr val="70AD47"/>
+      </a:accent6>
+      <a:hlink>
+        <a:srgbClr val="0563C1"/>
+      </a:hlink>
+      <a:folHlink>
+        <a:srgbClr val="954F72"/>
+      </a:folHlink>
+    </a:clrScheme>
+    <a:fontScheme name="Office">
+      <a:majorFont>
+        <a:latin typeface="Calibri Light" panose="020F0302020204030204"/>
+        <a:ea typeface=""/>
+        <a:cs typeface=""/>
+        <a:font script="Jpan" typeface="Yu Gothic Light"/>
+        <a:font script="Hang" typeface="맑은 고딕"/>
+        <a:font script="Hans" typeface="DengXian Light"/>
+        <a:font script="Hant" typeface="新細明體"/>
+        <a:font script="Arab" typeface="Times New Roman"/>
+        <a:font script="Hebr" typeface="Times New Roman"/>
+        <a:font script="Thai" typeface="Angsana New"/>
+        <a:font script="Ethi" typeface="Nyala"/>
+        <a:font script="Beng" typeface="Vrinda"/>
+        <a:font script="Gujr" typeface="Shruti"/>
+        <a:font script="Khmr" typeface="MoolBoran"/>
+        <a:font script="Knda" typeface="Tunga"/>
+        <a:font script="Guru" typeface="Raavi"/>
+        <a:font script="Cans" typeface="Euphemia"/>
+        <a:font script="Cher" typeface="Plantagenet Cherokee"/>
+        <a:font script="Yiii" typeface="Microsoft Yi Baiti"/>
+        <a:font script="Tibt" typeface="Microsoft Himalaya"/>
+        <a:font script="Thaa" typeface="MV Boli"/>
+        <a:font script="Deva" typeface="Mangal"/>
+        <a:font script="Telu" typeface="Gautami"/>
+        <a:font script="Taml" typeface="Latha"/>
+        <a:font script="Syrc" typeface="Estrangelo Edessa"/>
+        <a:font script="Orya" typeface="Kalinga"/>
+        <a:font script="Mlym" typeface="Kartika"/>
+        <a:font script="Laoo" typeface="DokChampa"/>
+        <a:font script="Sinh" typeface="Iskoola Pota"/>
+        <a:font script="Mong" typeface="Mongolian Baiti"/>
+        <a:font script="Viet" typeface="Times New Roman"/>
+        <a:font script="Uigh" typeface="Microsoft Uighur"/>
+        <a:font script="Geor" typeface="Sylfaen"/>
+      </a:majorFont>
+      <a:minorFont>
+        <a:latin typeface="Calibri" panose="020F0502020204030204"/>
+        <a:ea typeface=""/>
+        <a:cs typeface=""/>
+        <a:font script="Jpan" typeface="Yu Gothic"/>
+        <a:font script="Hang" typeface="맑은 고딕"/>
+        <a:font script="Hans" typeface="DengXian"/>
+        <a:font script="Hant" typeface="新細明體"/>
+        <a:font script="Arab" typeface="Arial"/>
+        <a:font script="Hebr" typeface="Arial"/>
+        <a:font script="Thai" typeface="Cordia New"/>
+        <a:font script="Ethi" typeface="Nyala"/>
+        <a:font script="Beng" typeface="Vrinda"/>
+        <a:font script="Gujr" typeface="Shruti"/>
+        <a:font script="Khmr" typeface="DaunPenh"/>
+        <a:font script="Knda" typeface="Tunga"/>
+        <a:font script="Guru" typeface="Raavi"/>
+        <a:font script="Cans" typeface="Euphemia"/>
+        <a:font script="Cher" typeface="Plantagenet Cherokee"/>
+        <a:font script="Yiii" typeface="Microsoft Yi Baiti"/>
+        <a:font script="Tibt" typeface="Microsoft Himalaya"/>
+        <a:font script="Thaa" typeface="MV Boli"/>
+        <a:font script="Deva" typeface="Mangal"/>
+        <a:font script="Telu" typeface="Gautami"/>
+        <a:font script="Taml" typeface="Latha"/>
+        <a:font script="Syrc" typeface="Estrangelo Edessa"/>
+        <a:font script="Orya" typeface="Kalinga"/>
+        <a:font script="Mlym" typeface="Kartika"/>
+        <a:font script="Laoo" typeface="DokChampa"/>
+        <a:font script="Sinh" typeface="Iskoola Pota"/>
+        <a:font script="Mong" typeface="Mongolian Baiti"/>
+        <a:font script="Viet" typeface="Arial"/>
+        <a:font script="Uigh" typeface="Microsoft Uighur"/>
+        <a:font script="Geor" typeface="Sylfaen"/>
+      </a:minorFont>
+    </a:fontScheme>
+    <a:fmtScheme name="Office">
+      <a:fillStyleLst>
+        <a:solidFill>
+          <a:schemeClr val="phClr"/>
+        </a:solidFill>
+        <a:gradFill rotWithShape="1">
+          <a:gsLst>
+            <a:gs pos="0">
+              <a:schemeClr val="phClr">
+                <a:lumMod val="110000"/>
+                <a:satMod val="105000"/>
+                <a:tint val="67000"/>
+              </a:schemeClr>
+            </a:gs>
+            <a:gs pos="50000">
+              <a:schemeClr val="phClr">
+                <a:lumMod val="105000"/>
+                <a:satMod val="103000"/>
+                <a:tint val="73000"/>
+              </a:schemeClr>
+            </a:gs>
+            <a:gs pos="100000">
+              <a:schemeClr val="phClr">
+                <a:lumMod val="105000"/>
+                <a:satMod val="109000"/>
+                <a:tint val="81000"/>
+              </a:schemeClr>
+            </a:gs>
+          </a:gsLst>
+          <a:lin ang="5400000" scaled="0"/>
+        </a:gradFill>
+        <a:gradFill rotWithShape="1">
+          <a:gsLst>
+            <a:gs pos="0">
+              <a:schemeClr val="phClr">
+                <a:satMod val="103000"/>
+                <a:lumMod val="102000"/>
+                <a:tint val="94000"/>
+              </a:schemeClr>
+            </a:gs>
+            <a:gs pos="50000">
+              <a:schemeClr val="phClr">
+                <a:satMod val="110000"/>
+                <a:lumMod val="100000"/>
+                <a:shade val="100000"/>
+              </a:schemeClr>
+            </a:gs>
+            <a:gs pos="100000">
+              <a:schemeClr val="phClr">
+                <a:lumMod val="99000"/>
+                <a:satMod val="120000"/>
+                <a:shade val="78000"/>
+              </a:schemeClr>
+            </a:gs>
+          </a:gsLst>
+          <a:lin ang="5400000" scaled="0"/>
+        </a:gradFill>
+      </a:fillStyleLst>
+      <a:lnStyleLst>
+        <a:ln w="6350" cap="flat" cmpd="sng" algn="ctr">
+          <a:solidFill>
+            <a:schemeClr val="phClr"/>
+          </a:solidFill>
+          <a:prstDash val="solid"/>
+          <a:miter lim="800000"/>
+        </a:ln>
+        <a:ln w="12700" cap="flat" cmpd="sng" algn="ctr">
+          <a:solidFill>
+            <a:schemeClr val="phClr"/>
+          </a:solidFill>
+          <a:prstDash val="solid"/>
+          <a:miter lim="800000"/>
+        </a:ln>
+        <a:ln w="19050" cap="flat" cmpd="sng" algn="ctr">
+          <a:solidFill>
+            <a:schemeClr val="phClr"/>
+          </a:solidFill>
+          <a:prstDash val="solid"/>
+          <a:miter lim="800000"/>
+        </a:ln>
+      </a:lnStyleLst>
+      <a:effectStyleLst>
+        <a:effectStyle>
+          <a:effectLst/>
+        </a:effectStyle>
+        <a:effectStyle>
+          <a:effectLst/>
+        </a:effectStyle>
+        <a:effectStyle>
+          <a:effectLst>
+            <a:outerShdw blurRad="57150" dist="19050" dir="5400000" algn="ctr" rotWithShape="0">
+              <a:srgbClr val="000000">
+                <a:alpha val="63000"/>
+              </a:srgbClr>
+            </a:outerShdw>
+          </a:effectLst>
+        </a:effectStyle>
+      </a:effectStyleLst>
+      <a:bgFillStyleLst>
+        <a:solidFill>
+          <a:schemeClr val="phClr"/>
+        </a:solidFill>
+        <a:solidFill>
+          <a:schemeClr val="phClr">
+            <a:tint val="95000"/>
+            <a:satMod val="170000"/>
+          </a:schemeClr>
+        </a:solidFill>
+        <a:gradFill rotWithShape="1">
+          <a:gsLst>
+            <a:gs pos="0">
+              <a:schemeClr val="phClr">
+                <a:tint val="93000"/>
+                <a:satMod val="150000"/>
+                <a:shade val="98000"/>
+                <a:lumMod val="102000"/>
+              </a:schemeClr>
+            </a:gs>
+            <a:gs pos="50000">
+              <a:schemeClr val="phClr">
+                <a:tint val="98000"/>
+                <a:satMod val="130000"/>
+                <a:shade val="90000"/>
+                <a:lumMod val="103000"/>
+              </a:schemeClr>
+            </a:gs>
+            <a:gs pos="100000">
+              <a:schemeClr val="phClr">
+                <a:shade val="63000"/>
+                <a:satMod val="120000"/>
+              </a:schemeClr>
+            </a:gs>
+          </a:gsLst>
+          <a:lin ang="5400000" scaled="0"/>
+        </a:gradFill>
+      </a:bgFillStyleLst>
+    </a:fmtScheme>
+  </a:themeElements>
+  <a:objectDefaults/>
+  <a:extraClrSchemeLst/>
+  <a:extLst>
+    <a:ext uri="{05A4C25C-085E-4340-85A3-A5531E510DB2}">
+      <thm15:themeFamily xmlns:thm15="http://schemas.microsoft.com/office/thememl/2012/main" name="Office Theme" id="{62F939B6-93AF-4DB8-9C6B-D6C7DFDC589F}" vid="{4A3C46E8-61CC-4603-A589-7422A47A8E4A}"/>
+    </a:ext>
+  </a:extLst>
+</a:theme>
 </file>
</xml_diff>